<commit_message>
UTH Feb - completed
</commit_message>
<xml_diff>
--- a/Posts/2021/Feb/UndertheHood/Thermo_square_02(Feb)_2021.pptx
+++ b/Posts/2021/Feb/UndertheHood/Thermo_square_02(Feb)_2021.pptx
@@ -10,6 +10,7 @@
     <p:sldId id="258" r:id="rId4"/>
     <p:sldId id="259" r:id="rId5"/>
     <p:sldId id="260" r:id="rId6"/>
+    <p:sldId id="261" r:id="rId7"/>
   </p:sldIdLst>
   <p:sldSz cx="12192000" cy="6858000"/>
   <p:notesSz cx="6858000" cy="9144000"/>
@@ -108,6 +109,11 @@
       </a:defRPr>
     </a:lvl9pPr>
   </p:defaultTextStyle>
+  <p:extLst>
+    <p:ext uri="{EFAFB233-063F-42B5-8137-9DF3F51BA10A}">
+      <p15:sldGuideLst xmlns:p15="http://schemas.microsoft.com/office/powerpoint/2012/main"/>
+    </p:ext>
+  </p:extLst>
 </p:presentation>
 </file>
 
@@ -258,7 +264,7 @@
           <a:p>
             <a:fld id="{EC210668-1077-44D9-BD17-4CA81784BE7A}" type="datetimeFigureOut">
               <a:rPr lang="en-US" smtClean="0"/>
-              <a:t>2/1/2021</a:t>
+              <a:t>2/6/2021</a:t>
             </a:fld>
             <a:endParaRPr lang="en-US"/>
           </a:p>
@@ -456,7 +462,7 @@
           <a:p>
             <a:fld id="{EC210668-1077-44D9-BD17-4CA81784BE7A}" type="datetimeFigureOut">
               <a:rPr lang="en-US" smtClean="0"/>
-              <a:t>2/1/2021</a:t>
+              <a:t>2/6/2021</a:t>
             </a:fld>
             <a:endParaRPr lang="en-US"/>
           </a:p>
@@ -664,7 +670,7 @@
           <a:p>
             <a:fld id="{EC210668-1077-44D9-BD17-4CA81784BE7A}" type="datetimeFigureOut">
               <a:rPr lang="en-US" smtClean="0"/>
-              <a:t>2/1/2021</a:t>
+              <a:t>2/6/2021</a:t>
             </a:fld>
             <a:endParaRPr lang="en-US"/>
           </a:p>
@@ -862,7 +868,7 @@
           <a:p>
             <a:fld id="{EC210668-1077-44D9-BD17-4CA81784BE7A}" type="datetimeFigureOut">
               <a:rPr lang="en-US" smtClean="0"/>
-              <a:t>2/1/2021</a:t>
+              <a:t>2/6/2021</a:t>
             </a:fld>
             <a:endParaRPr lang="en-US"/>
           </a:p>
@@ -1137,7 +1143,7 @@
           <a:p>
             <a:fld id="{EC210668-1077-44D9-BD17-4CA81784BE7A}" type="datetimeFigureOut">
               <a:rPr lang="en-US" smtClean="0"/>
-              <a:t>2/1/2021</a:t>
+              <a:t>2/6/2021</a:t>
             </a:fld>
             <a:endParaRPr lang="en-US"/>
           </a:p>
@@ -1402,7 +1408,7 @@
           <a:p>
             <a:fld id="{EC210668-1077-44D9-BD17-4CA81784BE7A}" type="datetimeFigureOut">
               <a:rPr lang="en-US" smtClean="0"/>
-              <a:t>2/1/2021</a:t>
+              <a:t>2/6/2021</a:t>
             </a:fld>
             <a:endParaRPr lang="en-US"/>
           </a:p>
@@ -1814,7 +1820,7 @@
           <a:p>
             <a:fld id="{EC210668-1077-44D9-BD17-4CA81784BE7A}" type="datetimeFigureOut">
               <a:rPr lang="en-US" smtClean="0"/>
-              <a:t>2/1/2021</a:t>
+              <a:t>2/6/2021</a:t>
             </a:fld>
             <a:endParaRPr lang="en-US"/>
           </a:p>
@@ -1955,7 +1961,7 @@
           <a:p>
             <a:fld id="{EC210668-1077-44D9-BD17-4CA81784BE7A}" type="datetimeFigureOut">
               <a:rPr lang="en-US" smtClean="0"/>
-              <a:t>2/1/2021</a:t>
+              <a:t>2/6/2021</a:t>
             </a:fld>
             <a:endParaRPr lang="en-US"/>
           </a:p>
@@ -2068,7 +2074,7 @@
           <a:p>
             <a:fld id="{EC210668-1077-44D9-BD17-4CA81784BE7A}" type="datetimeFigureOut">
               <a:rPr lang="en-US" smtClean="0"/>
-              <a:t>2/1/2021</a:t>
+              <a:t>2/6/2021</a:t>
             </a:fld>
             <a:endParaRPr lang="en-US"/>
           </a:p>
@@ -2379,7 +2385,7 @@
           <a:p>
             <a:fld id="{EC210668-1077-44D9-BD17-4CA81784BE7A}" type="datetimeFigureOut">
               <a:rPr lang="en-US" smtClean="0"/>
-              <a:t>2/1/2021</a:t>
+              <a:t>2/6/2021</a:t>
             </a:fld>
             <a:endParaRPr lang="en-US"/>
           </a:p>
@@ -2667,7 +2673,7 @@
           <a:p>
             <a:fld id="{EC210668-1077-44D9-BD17-4CA81784BE7A}" type="datetimeFigureOut">
               <a:rPr lang="en-US" smtClean="0"/>
-              <a:t>2/1/2021</a:t>
+              <a:t>2/6/2021</a:t>
             </a:fld>
             <a:endParaRPr lang="en-US"/>
           </a:p>
@@ -2908,7 +2914,7 @@
           <a:p>
             <a:fld id="{EC210668-1077-44D9-BD17-4CA81784BE7A}" type="datetimeFigureOut">
               <a:rPr lang="en-US" smtClean="0"/>
-              <a:t>2/1/2021</a:t>
+              <a:t>2/6/2021</a:t>
             </a:fld>
             <a:endParaRPr lang="en-US"/>
           </a:p>
@@ -3327,368 +3333,6 @@
       </p:grpSpPr>
       <p:sp>
         <p:nvSpPr>
-          <p:cNvPr id="54" name="Freeform: Shape 53">
-            <a:extLst>
-              <a:ext uri="{FF2B5EF4-FFF2-40B4-BE49-F238E27FC236}">
-                <a16:creationId xmlns:a16="http://schemas.microsoft.com/office/drawing/2014/main" id="{5B3A51CF-BC97-4875-B45E-2E3C2936930C}"/>
-              </a:ext>
-            </a:extLst>
-          </p:cNvPr>
-          <p:cNvSpPr/>
-          <p:nvPr/>
-        </p:nvSpPr>
-        <p:spPr>
-          <a:xfrm rot="5400000">
-            <a:off x="4373282" y="1228812"/>
-            <a:ext cx="3773096" cy="3769112"/>
-          </a:xfrm>
-          <a:custGeom>
-            <a:avLst/>
-            <a:gdLst>
-              <a:gd name="connsiteX0" fmla="*/ 0 w 3773096"/>
-              <a:gd name="connsiteY0" fmla="*/ 3715771 h 3769112"/>
-              <a:gd name="connsiteX1" fmla="*/ 0 w 3773096"/>
-              <a:gd name="connsiteY1" fmla="*/ 3502413 h 3769112"/>
-              <a:gd name="connsiteX2" fmla="*/ 53341 w 3773096"/>
-              <a:gd name="connsiteY2" fmla="*/ 3449072 h 3769112"/>
-              <a:gd name="connsiteX3" fmla="*/ 3453056 w 3773096"/>
-              <a:gd name="connsiteY3" fmla="*/ 3449072 h 3769112"/>
-              <a:gd name="connsiteX4" fmla="*/ 3453056 w 3773096"/>
-              <a:gd name="connsiteY4" fmla="*/ 53341 h 3769112"/>
-              <a:gd name="connsiteX5" fmla="*/ 3506397 w 3773096"/>
-              <a:gd name="connsiteY5" fmla="*/ 0 h 3769112"/>
-              <a:gd name="connsiteX6" fmla="*/ 3719755 w 3773096"/>
-              <a:gd name="connsiteY6" fmla="*/ 0 h 3769112"/>
-              <a:gd name="connsiteX7" fmla="*/ 3773096 w 3773096"/>
-              <a:gd name="connsiteY7" fmla="*/ 53341 h 3769112"/>
-              <a:gd name="connsiteX8" fmla="*/ 3773096 w 3773096"/>
-              <a:gd name="connsiteY8" fmla="*/ 3715771 h 3769112"/>
-              <a:gd name="connsiteX9" fmla="*/ 3719755 w 3773096"/>
-              <a:gd name="connsiteY9" fmla="*/ 3769112 h 3769112"/>
-              <a:gd name="connsiteX10" fmla="*/ 3715771 w 3773096"/>
-              <a:gd name="connsiteY10" fmla="*/ 3769112 h 3769112"/>
-              <a:gd name="connsiteX11" fmla="*/ 3506397 w 3773096"/>
-              <a:gd name="connsiteY11" fmla="*/ 3769112 h 3769112"/>
-              <a:gd name="connsiteX12" fmla="*/ 53341 w 3773096"/>
-              <a:gd name="connsiteY12" fmla="*/ 3769112 h 3769112"/>
-              <a:gd name="connsiteX13" fmla="*/ 0 w 3773096"/>
-              <a:gd name="connsiteY13" fmla="*/ 3715771 h 3769112"/>
-            </a:gdLst>
-            <a:ahLst/>
-            <a:cxnLst>
-              <a:cxn ang="0">
-                <a:pos x="connsiteX0" y="connsiteY0"/>
-              </a:cxn>
-              <a:cxn ang="0">
-                <a:pos x="connsiteX1" y="connsiteY1"/>
-              </a:cxn>
-              <a:cxn ang="0">
-                <a:pos x="connsiteX2" y="connsiteY2"/>
-              </a:cxn>
-              <a:cxn ang="0">
-                <a:pos x="connsiteX3" y="connsiteY3"/>
-              </a:cxn>
-              <a:cxn ang="0">
-                <a:pos x="connsiteX4" y="connsiteY4"/>
-              </a:cxn>
-              <a:cxn ang="0">
-                <a:pos x="connsiteX5" y="connsiteY5"/>
-              </a:cxn>
-              <a:cxn ang="0">
-                <a:pos x="connsiteX6" y="connsiteY6"/>
-              </a:cxn>
-              <a:cxn ang="0">
-                <a:pos x="connsiteX7" y="connsiteY7"/>
-              </a:cxn>
-              <a:cxn ang="0">
-                <a:pos x="connsiteX8" y="connsiteY8"/>
-              </a:cxn>
-              <a:cxn ang="0">
-                <a:pos x="connsiteX9" y="connsiteY9"/>
-              </a:cxn>
-              <a:cxn ang="0">
-                <a:pos x="connsiteX10" y="connsiteY10"/>
-              </a:cxn>
-              <a:cxn ang="0">
-                <a:pos x="connsiteX11" y="connsiteY11"/>
-              </a:cxn>
-              <a:cxn ang="0">
-                <a:pos x="connsiteX12" y="connsiteY12"/>
-              </a:cxn>
-              <a:cxn ang="0">
-                <a:pos x="connsiteX13" y="connsiteY13"/>
-              </a:cxn>
-            </a:cxnLst>
-            <a:rect l="l" t="t" r="r" b="b"/>
-            <a:pathLst>
-              <a:path w="3773096" h="3769112">
-                <a:moveTo>
-                  <a:pt x="0" y="3715771"/>
-                </a:moveTo>
-                <a:lnTo>
-                  <a:pt x="0" y="3502413"/>
-                </a:lnTo>
-                <a:cubicBezTo>
-                  <a:pt x="0" y="3472954"/>
-                  <a:pt x="23882" y="3449072"/>
-                  <a:pt x="53341" y="3449072"/>
-                </a:cubicBezTo>
-                <a:lnTo>
-                  <a:pt x="3453056" y="3449072"/>
-                </a:lnTo>
-                <a:lnTo>
-                  <a:pt x="3453056" y="53341"/>
-                </a:lnTo>
-                <a:cubicBezTo>
-                  <a:pt x="3453056" y="23882"/>
-                  <a:pt x="3476938" y="0"/>
-                  <a:pt x="3506397" y="0"/>
-                </a:cubicBezTo>
-                <a:lnTo>
-                  <a:pt x="3719755" y="0"/>
-                </a:lnTo>
-                <a:cubicBezTo>
-                  <a:pt x="3749214" y="0"/>
-                  <a:pt x="3773096" y="23882"/>
-                  <a:pt x="3773096" y="53341"/>
-                </a:cubicBezTo>
-                <a:lnTo>
-                  <a:pt x="3773096" y="3715771"/>
-                </a:lnTo>
-                <a:cubicBezTo>
-                  <a:pt x="3773096" y="3745230"/>
-                  <a:pt x="3749214" y="3769112"/>
-                  <a:pt x="3719755" y="3769112"/>
-                </a:cubicBezTo>
-                <a:lnTo>
-                  <a:pt x="3715771" y="3769112"/>
-                </a:lnTo>
-                <a:lnTo>
-                  <a:pt x="3506397" y="3769112"/>
-                </a:lnTo>
-                <a:lnTo>
-                  <a:pt x="53341" y="3769112"/>
-                </a:lnTo>
-                <a:cubicBezTo>
-                  <a:pt x="23882" y="3769112"/>
-                  <a:pt x="0" y="3745230"/>
-                  <a:pt x="0" y="3715771"/>
-                </a:cubicBezTo>
-                <a:close/>
-              </a:path>
-            </a:pathLst>
-          </a:custGeom>
-        </p:spPr>
-        <p:style>
-          <a:lnRef idx="2">
-            <a:schemeClr val="accent1">
-              <a:shade val="50000"/>
-            </a:schemeClr>
-          </a:lnRef>
-          <a:fillRef idx="1">
-            <a:schemeClr val="accent1"/>
-          </a:fillRef>
-          <a:effectRef idx="0">
-            <a:schemeClr val="accent1"/>
-          </a:effectRef>
-          <a:fontRef idx="minor">
-            <a:schemeClr val="lt1"/>
-          </a:fontRef>
-        </p:style>
-        <p:txBody>
-          <a:bodyPr wrap="square" rtlCol="0" anchor="ctr">
-            <a:noAutofit/>
-          </a:bodyPr>
-          <a:lstStyle/>
-          <a:p>
-            <a:pPr algn="ctr"/>
-            <a:endParaRPr lang="en-US"/>
-          </a:p>
-        </p:txBody>
-      </p:sp>
-      <p:sp>
-        <p:nvSpPr>
-          <p:cNvPr id="55" name="Freeform: Shape 54">
-            <a:extLst>
-              <a:ext uri="{FF2B5EF4-FFF2-40B4-BE49-F238E27FC236}">
-                <a16:creationId xmlns:a16="http://schemas.microsoft.com/office/drawing/2014/main" id="{138422CC-D497-4DA7-B0E6-C3832A1F7F2F}"/>
-              </a:ext>
-            </a:extLst>
-          </p:cNvPr>
-          <p:cNvSpPr/>
-          <p:nvPr/>
-        </p:nvSpPr>
-        <p:spPr>
-          <a:xfrm rot="5400000">
-            <a:off x="4375274" y="1226820"/>
-            <a:ext cx="3769112" cy="3769112"/>
-          </a:xfrm>
-          <a:custGeom>
-            <a:avLst/>
-            <a:gdLst>
-              <a:gd name="connsiteX0" fmla="*/ 0 w 3769112"/>
-              <a:gd name="connsiteY0" fmla="*/ 3715771 h 3769112"/>
-              <a:gd name="connsiteX1" fmla="*/ 0 w 3769112"/>
-              <a:gd name="connsiteY1" fmla="*/ 266699 h 3769112"/>
-              <a:gd name="connsiteX2" fmla="*/ 0 w 3769112"/>
-              <a:gd name="connsiteY2" fmla="*/ 53341 h 3769112"/>
-              <a:gd name="connsiteX3" fmla="*/ 53341 w 3769112"/>
-              <a:gd name="connsiteY3" fmla="*/ 0 h 3769112"/>
-              <a:gd name="connsiteX4" fmla="*/ 266699 w 3769112"/>
-              <a:gd name="connsiteY4" fmla="*/ 0 h 3769112"/>
-              <a:gd name="connsiteX5" fmla="*/ 3715771 w 3769112"/>
-              <a:gd name="connsiteY5" fmla="*/ 0 h 3769112"/>
-              <a:gd name="connsiteX6" fmla="*/ 3769112 w 3769112"/>
-              <a:gd name="connsiteY6" fmla="*/ 53341 h 3769112"/>
-              <a:gd name="connsiteX7" fmla="*/ 3769112 w 3769112"/>
-              <a:gd name="connsiteY7" fmla="*/ 266699 h 3769112"/>
-              <a:gd name="connsiteX8" fmla="*/ 3715771 w 3769112"/>
-              <a:gd name="connsiteY8" fmla="*/ 320040 h 3769112"/>
-              <a:gd name="connsiteX9" fmla="*/ 320040 w 3769112"/>
-              <a:gd name="connsiteY9" fmla="*/ 320040 h 3769112"/>
-              <a:gd name="connsiteX10" fmla="*/ 320040 w 3769112"/>
-              <a:gd name="connsiteY10" fmla="*/ 3715771 h 3769112"/>
-              <a:gd name="connsiteX11" fmla="*/ 266699 w 3769112"/>
-              <a:gd name="connsiteY11" fmla="*/ 3769112 h 3769112"/>
-              <a:gd name="connsiteX12" fmla="*/ 53341 w 3769112"/>
-              <a:gd name="connsiteY12" fmla="*/ 3769112 h 3769112"/>
-              <a:gd name="connsiteX13" fmla="*/ 0 w 3769112"/>
-              <a:gd name="connsiteY13" fmla="*/ 3715771 h 3769112"/>
-            </a:gdLst>
-            <a:ahLst/>
-            <a:cxnLst>
-              <a:cxn ang="0">
-                <a:pos x="connsiteX0" y="connsiteY0"/>
-              </a:cxn>
-              <a:cxn ang="0">
-                <a:pos x="connsiteX1" y="connsiteY1"/>
-              </a:cxn>
-              <a:cxn ang="0">
-                <a:pos x="connsiteX2" y="connsiteY2"/>
-              </a:cxn>
-              <a:cxn ang="0">
-                <a:pos x="connsiteX3" y="connsiteY3"/>
-              </a:cxn>
-              <a:cxn ang="0">
-                <a:pos x="connsiteX4" y="connsiteY4"/>
-              </a:cxn>
-              <a:cxn ang="0">
-                <a:pos x="connsiteX5" y="connsiteY5"/>
-              </a:cxn>
-              <a:cxn ang="0">
-                <a:pos x="connsiteX6" y="connsiteY6"/>
-              </a:cxn>
-              <a:cxn ang="0">
-                <a:pos x="connsiteX7" y="connsiteY7"/>
-              </a:cxn>
-              <a:cxn ang="0">
-                <a:pos x="connsiteX8" y="connsiteY8"/>
-              </a:cxn>
-              <a:cxn ang="0">
-                <a:pos x="connsiteX9" y="connsiteY9"/>
-              </a:cxn>
-              <a:cxn ang="0">
-                <a:pos x="connsiteX10" y="connsiteY10"/>
-              </a:cxn>
-              <a:cxn ang="0">
-                <a:pos x="connsiteX11" y="connsiteY11"/>
-              </a:cxn>
-              <a:cxn ang="0">
-                <a:pos x="connsiteX12" y="connsiteY12"/>
-              </a:cxn>
-              <a:cxn ang="0">
-                <a:pos x="connsiteX13" y="connsiteY13"/>
-              </a:cxn>
-            </a:cxnLst>
-            <a:rect l="l" t="t" r="r" b="b"/>
-            <a:pathLst>
-              <a:path w="3769112" h="3769112">
-                <a:moveTo>
-                  <a:pt x="0" y="3715771"/>
-                </a:moveTo>
-                <a:lnTo>
-                  <a:pt x="0" y="266699"/>
-                </a:lnTo>
-                <a:lnTo>
-                  <a:pt x="0" y="53341"/>
-                </a:lnTo>
-                <a:cubicBezTo>
-                  <a:pt x="0" y="23882"/>
-                  <a:pt x="23882" y="0"/>
-                  <a:pt x="53341" y="0"/>
-                </a:cubicBezTo>
-                <a:lnTo>
-                  <a:pt x="266699" y="0"/>
-                </a:lnTo>
-                <a:lnTo>
-                  <a:pt x="3715771" y="0"/>
-                </a:lnTo>
-                <a:cubicBezTo>
-                  <a:pt x="3745230" y="0"/>
-                  <a:pt x="3769112" y="23882"/>
-                  <a:pt x="3769112" y="53341"/>
-                </a:cubicBezTo>
-                <a:lnTo>
-                  <a:pt x="3769112" y="266699"/>
-                </a:lnTo>
-                <a:cubicBezTo>
-                  <a:pt x="3769112" y="296158"/>
-                  <a:pt x="3745230" y="320040"/>
-                  <a:pt x="3715771" y="320040"/>
-                </a:cubicBezTo>
-                <a:lnTo>
-                  <a:pt x="320040" y="320040"/>
-                </a:lnTo>
-                <a:lnTo>
-                  <a:pt x="320040" y="3715771"/>
-                </a:lnTo>
-                <a:cubicBezTo>
-                  <a:pt x="320040" y="3745230"/>
-                  <a:pt x="296158" y="3769112"/>
-                  <a:pt x="266699" y="3769112"/>
-                </a:cubicBezTo>
-                <a:lnTo>
-                  <a:pt x="53341" y="3769112"/>
-                </a:lnTo>
-                <a:cubicBezTo>
-                  <a:pt x="23882" y="3769112"/>
-                  <a:pt x="0" y="3745230"/>
-                  <a:pt x="0" y="3715771"/>
-                </a:cubicBezTo>
-                <a:close/>
-              </a:path>
-            </a:pathLst>
-          </a:custGeom>
-        </p:spPr>
-        <p:style>
-          <a:lnRef idx="2">
-            <a:schemeClr val="accent1">
-              <a:shade val="50000"/>
-            </a:schemeClr>
-          </a:lnRef>
-          <a:fillRef idx="1">
-            <a:schemeClr val="accent1"/>
-          </a:fillRef>
-          <a:effectRef idx="0">
-            <a:schemeClr val="accent1"/>
-          </a:effectRef>
-          <a:fontRef idx="minor">
-            <a:schemeClr val="lt1"/>
-          </a:fontRef>
-        </p:style>
-        <p:txBody>
-          <a:bodyPr wrap="square" rtlCol="0" anchor="ctr">
-            <a:noAutofit/>
-          </a:bodyPr>
-          <a:lstStyle/>
-          <a:p>
-            <a:pPr algn="ctr"/>
-            <a:endParaRPr lang="en-US"/>
-          </a:p>
-        </p:txBody>
-      </p:sp>
-      <p:sp>
-        <p:nvSpPr>
           <p:cNvPr id="25" name="Rectangle 24">
             <a:extLst>
               <a:ext uri="{FF2B5EF4-FFF2-40B4-BE49-F238E27FC236}">
@@ -3736,8 +3380,8 @@
           </a:p>
         </p:txBody>
       </p:sp>
-      <mc:AlternateContent xmlns:mc="http://schemas.openxmlformats.org/markup-compatibility/2006">
-        <mc:Choice xmlns:a14="http://schemas.microsoft.com/office/drawing/2010/main" Requires="a14">
+      <mc:AlternateContent xmlns:mc="http://schemas.openxmlformats.org/markup-compatibility/2006" xmlns:a14="http://schemas.microsoft.com/office/drawing/2010/main">
+        <mc:Choice Requires="a14">
           <p:sp>
             <p:nvSpPr>
               <p:cNvPr id="26" name="TextBox 25">
@@ -3766,6 +3410,7 @@
               </a:bodyPr>
               <a:lstStyle/>
               <a:p>
+                <a:pPr/>
                 <a14:m>
                   <m:oMathPara xmlns:m="http://schemas.openxmlformats.org/officeDocument/2006/math">
                     <m:oMathParaPr>
@@ -3786,7 +3431,7 @@
             </p:txBody>
           </p:sp>
         </mc:Choice>
-        <mc:Fallback>
+        <mc:Fallback xmlns="">
           <p:sp>
             <p:nvSpPr>
               <p:cNvPr id="26" name="TextBox 25">
@@ -3831,8 +3476,8 @@
           </p:sp>
         </mc:Fallback>
       </mc:AlternateContent>
-      <mc:AlternateContent xmlns:mc="http://schemas.openxmlformats.org/markup-compatibility/2006">
-        <mc:Choice xmlns:a14="http://schemas.microsoft.com/office/drawing/2010/main" Requires="a14">
+      <mc:AlternateContent xmlns:mc="http://schemas.openxmlformats.org/markup-compatibility/2006" xmlns:a14="http://schemas.microsoft.com/office/drawing/2010/main">
+        <mc:Choice Requires="a14">
           <p:sp>
             <p:nvSpPr>
               <p:cNvPr id="27" name="TextBox 26">
@@ -3861,6 +3506,7 @@
               </a:bodyPr>
               <a:lstStyle/>
               <a:p>
+                <a:pPr/>
                 <a14:m>
                   <m:oMathPara xmlns:m="http://schemas.openxmlformats.org/officeDocument/2006/math">
                     <m:oMathParaPr>
@@ -3881,7 +3527,7 @@
             </p:txBody>
           </p:sp>
         </mc:Choice>
-        <mc:Fallback>
+        <mc:Fallback xmlns="">
           <p:sp>
             <p:nvSpPr>
               <p:cNvPr id="27" name="TextBox 26">
@@ -3926,8 +3572,8 @@
           </p:sp>
         </mc:Fallback>
       </mc:AlternateContent>
-      <mc:AlternateContent xmlns:mc="http://schemas.openxmlformats.org/markup-compatibility/2006">
-        <mc:Choice xmlns:a14="http://schemas.microsoft.com/office/drawing/2010/main" Requires="a14">
+      <mc:AlternateContent xmlns:mc="http://schemas.openxmlformats.org/markup-compatibility/2006" xmlns:a14="http://schemas.microsoft.com/office/drawing/2010/main">
+        <mc:Choice Requires="a14">
           <p:sp>
             <p:nvSpPr>
               <p:cNvPr id="28" name="TextBox 27">
@@ -3956,6 +3602,7 @@
               </a:bodyPr>
               <a:lstStyle/>
               <a:p>
+                <a:pPr/>
                 <a14:m>
                   <m:oMathPara xmlns:m="http://schemas.openxmlformats.org/officeDocument/2006/math">
                     <m:oMathParaPr>
@@ -3976,7 +3623,7 @@
             </p:txBody>
           </p:sp>
         </mc:Choice>
-        <mc:Fallback>
+        <mc:Fallback xmlns="">
           <p:sp>
             <p:nvSpPr>
               <p:cNvPr id="28" name="TextBox 27">
@@ -4021,8 +3668,8 @@
           </p:sp>
         </mc:Fallback>
       </mc:AlternateContent>
-      <mc:AlternateContent xmlns:mc="http://schemas.openxmlformats.org/markup-compatibility/2006">
-        <mc:Choice xmlns:a14="http://schemas.microsoft.com/office/drawing/2010/main" Requires="a14">
+      <mc:AlternateContent xmlns:mc="http://schemas.openxmlformats.org/markup-compatibility/2006" xmlns:a14="http://schemas.microsoft.com/office/drawing/2010/main">
+        <mc:Choice Requires="a14">
           <p:sp>
             <p:nvSpPr>
               <p:cNvPr id="33" name="TextBox 32">
@@ -4051,6 +3698,7 @@
               </a:bodyPr>
               <a:lstStyle/>
               <a:p>
+                <a:pPr/>
                 <a14:m>
                   <m:oMathPara xmlns:m="http://schemas.openxmlformats.org/officeDocument/2006/math">
                     <m:oMathParaPr>
@@ -4071,7 +3719,7 @@
             </p:txBody>
           </p:sp>
         </mc:Choice>
-        <mc:Fallback>
+        <mc:Fallback xmlns="">
           <p:sp>
             <p:nvSpPr>
               <p:cNvPr id="33" name="TextBox 32">
@@ -4116,8 +3764,8 @@
           </p:sp>
         </mc:Fallback>
       </mc:AlternateContent>
-      <mc:AlternateContent xmlns:mc="http://schemas.openxmlformats.org/markup-compatibility/2006">
-        <mc:Choice xmlns:a14="http://schemas.microsoft.com/office/drawing/2010/main" Requires="a14">
+      <mc:AlternateContent xmlns:mc="http://schemas.openxmlformats.org/markup-compatibility/2006" xmlns:a14="http://schemas.microsoft.com/office/drawing/2010/main">
+        <mc:Choice Requires="a14">
           <p:sp>
             <p:nvSpPr>
               <p:cNvPr id="34" name="TextBox 33">
@@ -4146,6 +3794,7 @@
               </a:bodyPr>
               <a:lstStyle/>
               <a:p>
+                <a:pPr/>
                 <a14:m>
                   <m:oMathPara xmlns:m="http://schemas.openxmlformats.org/officeDocument/2006/math">
                     <m:oMathParaPr>
@@ -4166,7 +3815,7 @@
             </p:txBody>
           </p:sp>
         </mc:Choice>
-        <mc:Fallback>
+        <mc:Fallback xmlns="">
           <p:sp>
             <p:nvSpPr>
               <p:cNvPr id="34" name="TextBox 33">
@@ -4211,8 +3860,8 @@
           </p:sp>
         </mc:Fallback>
       </mc:AlternateContent>
-      <mc:AlternateContent xmlns:mc="http://schemas.openxmlformats.org/markup-compatibility/2006">
-        <mc:Choice xmlns:a14="http://schemas.microsoft.com/office/drawing/2010/main" Requires="a14">
+      <mc:AlternateContent xmlns:mc="http://schemas.openxmlformats.org/markup-compatibility/2006" xmlns:a14="http://schemas.microsoft.com/office/drawing/2010/main">
+        <mc:Choice Requires="a14">
           <p:sp>
             <p:nvSpPr>
               <p:cNvPr id="35" name="TextBox 34">
@@ -4241,6 +3890,7 @@
               </a:bodyPr>
               <a:lstStyle/>
               <a:p>
+                <a:pPr/>
                 <a14:m>
                   <m:oMathPara xmlns:m="http://schemas.openxmlformats.org/officeDocument/2006/math">
                     <m:oMathParaPr>
@@ -4261,7 +3911,7 @@
             </p:txBody>
           </p:sp>
         </mc:Choice>
-        <mc:Fallback>
+        <mc:Fallback xmlns="">
           <p:sp>
             <p:nvSpPr>
               <p:cNvPr id="35" name="TextBox 34">
@@ -4306,8 +3956,8 @@
           </p:sp>
         </mc:Fallback>
       </mc:AlternateContent>
-      <mc:AlternateContent xmlns:mc="http://schemas.openxmlformats.org/markup-compatibility/2006">
-        <mc:Choice xmlns:a14="http://schemas.microsoft.com/office/drawing/2010/main" Requires="a14">
+      <mc:AlternateContent xmlns:mc="http://schemas.openxmlformats.org/markup-compatibility/2006" xmlns:a14="http://schemas.microsoft.com/office/drawing/2010/main">
+        <mc:Choice Requires="a14">
           <p:sp>
             <p:nvSpPr>
               <p:cNvPr id="36" name="TextBox 35">
@@ -4336,6 +3986,7 @@
               </a:bodyPr>
               <a:lstStyle/>
               <a:p>
+                <a:pPr/>
                 <a14:m>
                   <m:oMathPara xmlns:m="http://schemas.openxmlformats.org/officeDocument/2006/math">
                     <m:oMathParaPr>
@@ -4356,7 +4007,7 @@
             </p:txBody>
           </p:sp>
         </mc:Choice>
-        <mc:Fallback>
+        <mc:Fallback xmlns="">
           <p:sp>
             <p:nvSpPr>
               <p:cNvPr id="36" name="TextBox 35">
@@ -4401,8 +4052,8 @@
           </p:sp>
         </mc:Fallback>
       </mc:AlternateContent>
-      <mc:AlternateContent xmlns:mc="http://schemas.openxmlformats.org/markup-compatibility/2006">
-        <mc:Choice xmlns:a14="http://schemas.microsoft.com/office/drawing/2010/main" Requires="a14">
+      <mc:AlternateContent xmlns:mc="http://schemas.openxmlformats.org/markup-compatibility/2006" xmlns:a14="http://schemas.microsoft.com/office/drawing/2010/main">
+        <mc:Choice Requires="a14">
           <p:sp>
             <p:nvSpPr>
               <p:cNvPr id="37" name="TextBox 36">
@@ -4431,6 +4082,7 @@
               </a:bodyPr>
               <a:lstStyle/>
               <a:p>
+                <a:pPr/>
                 <a14:m>
                   <m:oMathPara xmlns:m="http://schemas.openxmlformats.org/officeDocument/2006/math">
                     <m:oMathParaPr>
@@ -4451,7 +4103,7 @@
             </p:txBody>
           </p:sp>
         </mc:Choice>
-        <mc:Fallback>
+        <mc:Fallback xmlns="">
           <p:sp>
             <p:nvSpPr>
               <p:cNvPr id="37" name="TextBox 36">
@@ -5035,8 +4687,8 @@
           </a:p>
         </p:txBody>
       </p:sp>
-      <mc:AlternateContent xmlns:mc="http://schemas.openxmlformats.org/markup-compatibility/2006">
-        <mc:Choice xmlns:a14="http://schemas.microsoft.com/office/drawing/2010/main" Requires="a14">
+      <mc:AlternateContent xmlns:mc="http://schemas.openxmlformats.org/markup-compatibility/2006" xmlns:a14="http://schemas.microsoft.com/office/drawing/2010/main">
+        <mc:Choice Requires="a14">
           <p:sp>
             <p:nvSpPr>
               <p:cNvPr id="26" name="TextBox 25">
@@ -5065,6 +4717,7 @@
               </a:bodyPr>
               <a:lstStyle/>
               <a:p>
+                <a:pPr/>
                 <a14:m>
                   <m:oMathPara xmlns:m="http://schemas.openxmlformats.org/officeDocument/2006/math">
                     <m:oMathParaPr>
@@ -5085,7 +4738,7 @@
             </p:txBody>
           </p:sp>
         </mc:Choice>
-        <mc:Fallback>
+        <mc:Fallback xmlns="">
           <p:sp>
             <p:nvSpPr>
               <p:cNvPr id="26" name="TextBox 25">
@@ -5130,8 +4783,8 @@
           </p:sp>
         </mc:Fallback>
       </mc:AlternateContent>
-      <mc:AlternateContent xmlns:mc="http://schemas.openxmlformats.org/markup-compatibility/2006">
-        <mc:Choice xmlns:a14="http://schemas.microsoft.com/office/drawing/2010/main" Requires="a14">
+      <mc:AlternateContent xmlns:mc="http://schemas.openxmlformats.org/markup-compatibility/2006" xmlns:a14="http://schemas.microsoft.com/office/drawing/2010/main">
+        <mc:Choice Requires="a14">
           <p:sp>
             <p:nvSpPr>
               <p:cNvPr id="27" name="TextBox 26">
@@ -5160,6 +4813,7 @@
               </a:bodyPr>
               <a:lstStyle/>
               <a:p>
+                <a:pPr/>
                 <a14:m>
                   <m:oMathPara xmlns:m="http://schemas.openxmlformats.org/officeDocument/2006/math">
                     <m:oMathParaPr>
@@ -5180,7 +4834,7 @@
             </p:txBody>
           </p:sp>
         </mc:Choice>
-        <mc:Fallback>
+        <mc:Fallback xmlns="">
           <p:sp>
             <p:nvSpPr>
               <p:cNvPr id="27" name="TextBox 26">
@@ -5225,8 +4879,8 @@
           </p:sp>
         </mc:Fallback>
       </mc:AlternateContent>
-      <mc:AlternateContent xmlns:mc="http://schemas.openxmlformats.org/markup-compatibility/2006">
-        <mc:Choice xmlns:a14="http://schemas.microsoft.com/office/drawing/2010/main" Requires="a14">
+      <mc:AlternateContent xmlns:mc="http://schemas.openxmlformats.org/markup-compatibility/2006" xmlns:a14="http://schemas.microsoft.com/office/drawing/2010/main">
+        <mc:Choice Requires="a14">
           <p:sp>
             <p:nvSpPr>
               <p:cNvPr id="28" name="TextBox 27">
@@ -5255,6 +4909,7 @@
               </a:bodyPr>
               <a:lstStyle/>
               <a:p>
+                <a:pPr/>
                 <a14:m>
                   <m:oMathPara xmlns:m="http://schemas.openxmlformats.org/officeDocument/2006/math">
                     <m:oMathParaPr>
@@ -5275,7 +4930,7 @@
             </p:txBody>
           </p:sp>
         </mc:Choice>
-        <mc:Fallback>
+        <mc:Fallback xmlns="">
           <p:sp>
             <p:nvSpPr>
               <p:cNvPr id="28" name="TextBox 27">
@@ -5320,8 +4975,8 @@
           </p:sp>
         </mc:Fallback>
       </mc:AlternateContent>
-      <mc:AlternateContent xmlns:mc="http://schemas.openxmlformats.org/markup-compatibility/2006">
-        <mc:Choice xmlns:a14="http://schemas.microsoft.com/office/drawing/2010/main" Requires="a14">
+      <mc:AlternateContent xmlns:mc="http://schemas.openxmlformats.org/markup-compatibility/2006" xmlns:a14="http://schemas.microsoft.com/office/drawing/2010/main">
+        <mc:Choice Requires="a14">
           <p:sp>
             <p:nvSpPr>
               <p:cNvPr id="33" name="TextBox 32">
@@ -5350,6 +5005,7 @@
               </a:bodyPr>
               <a:lstStyle/>
               <a:p>
+                <a:pPr/>
                 <a14:m>
                   <m:oMathPara xmlns:m="http://schemas.openxmlformats.org/officeDocument/2006/math">
                     <m:oMathParaPr>
@@ -5370,7 +5026,7 @@
             </p:txBody>
           </p:sp>
         </mc:Choice>
-        <mc:Fallback>
+        <mc:Fallback xmlns="">
           <p:sp>
             <p:nvSpPr>
               <p:cNvPr id="33" name="TextBox 32">
@@ -5415,8 +5071,8 @@
           </p:sp>
         </mc:Fallback>
       </mc:AlternateContent>
-      <mc:AlternateContent xmlns:mc="http://schemas.openxmlformats.org/markup-compatibility/2006">
-        <mc:Choice xmlns:a14="http://schemas.microsoft.com/office/drawing/2010/main" Requires="a14">
+      <mc:AlternateContent xmlns:mc="http://schemas.openxmlformats.org/markup-compatibility/2006" xmlns:a14="http://schemas.microsoft.com/office/drawing/2010/main">
+        <mc:Choice Requires="a14">
           <p:sp>
             <p:nvSpPr>
               <p:cNvPr id="34" name="TextBox 33">
@@ -5445,6 +5101,7 @@
               </a:bodyPr>
               <a:lstStyle/>
               <a:p>
+                <a:pPr/>
                 <a14:m>
                   <m:oMathPara xmlns:m="http://schemas.openxmlformats.org/officeDocument/2006/math">
                     <m:oMathParaPr>
@@ -5465,7 +5122,7 @@
             </p:txBody>
           </p:sp>
         </mc:Choice>
-        <mc:Fallback>
+        <mc:Fallback xmlns="">
           <p:sp>
             <p:nvSpPr>
               <p:cNvPr id="34" name="TextBox 33">
@@ -5510,8 +5167,8 @@
           </p:sp>
         </mc:Fallback>
       </mc:AlternateContent>
-      <mc:AlternateContent xmlns:mc="http://schemas.openxmlformats.org/markup-compatibility/2006">
-        <mc:Choice xmlns:a14="http://schemas.microsoft.com/office/drawing/2010/main" Requires="a14">
+      <mc:AlternateContent xmlns:mc="http://schemas.openxmlformats.org/markup-compatibility/2006" xmlns:a14="http://schemas.microsoft.com/office/drawing/2010/main">
+        <mc:Choice Requires="a14">
           <p:sp>
             <p:nvSpPr>
               <p:cNvPr id="35" name="TextBox 34">
@@ -5540,6 +5197,7 @@
               </a:bodyPr>
               <a:lstStyle/>
               <a:p>
+                <a:pPr/>
                 <a14:m>
                   <m:oMathPara xmlns:m="http://schemas.openxmlformats.org/officeDocument/2006/math">
                     <m:oMathParaPr>
@@ -5560,7 +5218,7 @@
             </p:txBody>
           </p:sp>
         </mc:Choice>
-        <mc:Fallback>
+        <mc:Fallback xmlns="">
           <p:sp>
             <p:nvSpPr>
               <p:cNvPr id="35" name="TextBox 34">
@@ -5605,8 +5263,8 @@
           </p:sp>
         </mc:Fallback>
       </mc:AlternateContent>
-      <mc:AlternateContent xmlns:mc="http://schemas.openxmlformats.org/markup-compatibility/2006">
-        <mc:Choice xmlns:a14="http://schemas.microsoft.com/office/drawing/2010/main" Requires="a14">
+      <mc:AlternateContent xmlns:mc="http://schemas.openxmlformats.org/markup-compatibility/2006" xmlns:a14="http://schemas.microsoft.com/office/drawing/2010/main">
+        <mc:Choice Requires="a14">
           <p:sp>
             <p:nvSpPr>
               <p:cNvPr id="36" name="TextBox 35">
@@ -5635,6 +5293,7 @@
               </a:bodyPr>
               <a:lstStyle/>
               <a:p>
+                <a:pPr/>
                 <a14:m>
                   <m:oMathPara xmlns:m="http://schemas.openxmlformats.org/officeDocument/2006/math">
                     <m:oMathParaPr>
@@ -5655,7 +5314,7 @@
             </p:txBody>
           </p:sp>
         </mc:Choice>
-        <mc:Fallback>
+        <mc:Fallback xmlns="">
           <p:sp>
             <p:nvSpPr>
               <p:cNvPr id="36" name="TextBox 35">
@@ -5700,8 +5359,8 @@
           </p:sp>
         </mc:Fallback>
       </mc:AlternateContent>
-      <mc:AlternateContent xmlns:mc="http://schemas.openxmlformats.org/markup-compatibility/2006">
-        <mc:Choice xmlns:a14="http://schemas.microsoft.com/office/drawing/2010/main" Requires="a14">
+      <mc:AlternateContent xmlns:mc="http://schemas.openxmlformats.org/markup-compatibility/2006" xmlns:a14="http://schemas.microsoft.com/office/drawing/2010/main">
+        <mc:Choice Requires="a14">
           <p:sp>
             <p:nvSpPr>
               <p:cNvPr id="37" name="TextBox 36">
@@ -5730,6 +5389,7 @@
               </a:bodyPr>
               <a:lstStyle/>
               <a:p>
+                <a:pPr/>
                 <a14:m>
                   <m:oMathPara xmlns:m="http://schemas.openxmlformats.org/officeDocument/2006/math">
                     <m:oMathParaPr>
@@ -5750,7 +5410,7 @@
             </p:txBody>
           </p:sp>
         </mc:Choice>
-        <mc:Fallback>
+        <mc:Fallback xmlns="">
           <p:sp>
             <p:nvSpPr>
               <p:cNvPr id="37" name="TextBox 36">
@@ -5877,8 +5537,8 @@
           </a:fontRef>
         </p:style>
       </p:cxnSp>
-      <mc:AlternateContent xmlns:mc="http://schemas.openxmlformats.org/markup-compatibility/2006">
-        <mc:Choice xmlns:a14="http://schemas.microsoft.com/office/drawing/2010/main" Requires="a14">
+      <mc:AlternateContent xmlns:mc="http://schemas.openxmlformats.org/markup-compatibility/2006" xmlns:a14="http://schemas.microsoft.com/office/drawing/2010/main">
+        <mc:Choice Requires="a14">
           <p:sp>
             <p:nvSpPr>
               <p:cNvPr id="2" name="TextBox 1">
@@ -5907,6 +5567,7 @@
               </a:bodyPr>
               <a:lstStyle/>
               <a:p>
+                <a:pPr/>
                 <a14:m>
                   <m:oMathPara xmlns:m="http://schemas.openxmlformats.org/officeDocument/2006/math">
                     <m:oMathParaPr>
@@ -6067,7 +5728,7 @@
             </p:txBody>
           </p:sp>
         </mc:Choice>
-        <mc:Fallback>
+        <mc:Fallback xmlns="">
           <p:sp>
             <p:nvSpPr>
               <p:cNvPr id="2" name="TextBox 1">
@@ -6569,8 +6230,8 @@
           </a:p>
         </p:txBody>
       </p:sp>
-      <mc:AlternateContent xmlns:mc="http://schemas.openxmlformats.org/markup-compatibility/2006">
-        <mc:Choice xmlns:a14="http://schemas.microsoft.com/office/drawing/2010/main" Requires="a14">
+      <mc:AlternateContent xmlns:mc="http://schemas.openxmlformats.org/markup-compatibility/2006" xmlns:a14="http://schemas.microsoft.com/office/drawing/2010/main">
+        <mc:Choice Requires="a14">
           <p:sp>
             <p:nvSpPr>
               <p:cNvPr id="26" name="TextBox 25">
@@ -6599,6 +6260,7 @@
               </a:bodyPr>
               <a:lstStyle/>
               <a:p>
+                <a:pPr/>
                 <a14:m>
                   <m:oMathPara xmlns:m="http://schemas.openxmlformats.org/officeDocument/2006/math">
                     <m:oMathParaPr>
@@ -6619,7 +6281,7 @@
             </p:txBody>
           </p:sp>
         </mc:Choice>
-        <mc:Fallback>
+        <mc:Fallback xmlns="">
           <p:sp>
             <p:nvSpPr>
               <p:cNvPr id="26" name="TextBox 25">
@@ -6664,8 +6326,8 @@
           </p:sp>
         </mc:Fallback>
       </mc:AlternateContent>
-      <mc:AlternateContent xmlns:mc="http://schemas.openxmlformats.org/markup-compatibility/2006">
-        <mc:Choice xmlns:a14="http://schemas.microsoft.com/office/drawing/2010/main" Requires="a14">
+      <mc:AlternateContent xmlns:mc="http://schemas.openxmlformats.org/markup-compatibility/2006" xmlns:a14="http://schemas.microsoft.com/office/drawing/2010/main">
+        <mc:Choice Requires="a14">
           <p:sp>
             <p:nvSpPr>
               <p:cNvPr id="27" name="TextBox 26">
@@ -6694,6 +6356,7 @@
               </a:bodyPr>
               <a:lstStyle/>
               <a:p>
+                <a:pPr/>
                 <a14:m>
                   <m:oMathPara xmlns:m="http://schemas.openxmlformats.org/officeDocument/2006/math">
                     <m:oMathParaPr>
@@ -6714,7 +6377,7 @@
             </p:txBody>
           </p:sp>
         </mc:Choice>
-        <mc:Fallback>
+        <mc:Fallback xmlns="">
           <p:sp>
             <p:nvSpPr>
               <p:cNvPr id="27" name="TextBox 26">
@@ -6759,8 +6422,8 @@
           </p:sp>
         </mc:Fallback>
       </mc:AlternateContent>
-      <mc:AlternateContent xmlns:mc="http://schemas.openxmlformats.org/markup-compatibility/2006">
-        <mc:Choice xmlns:a14="http://schemas.microsoft.com/office/drawing/2010/main" Requires="a14">
+      <mc:AlternateContent xmlns:mc="http://schemas.openxmlformats.org/markup-compatibility/2006" xmlns:a14="http://schemas.microsoft.com/office/drawing/2010/main">
+        <mc:Choice Requires="a14">
           <p:sp>
             <p:nvSpPr>
               <p:cNvPr id="28" name="TextBox 27">
@@ -6789,6 +6452,7 @@
               </a:bodyPr>
               <a:lstStyle/>
               <a:p>
+                <a:pPr/>
                 <a14:m>
                   <m:oMathPara xmlns:m="http://schemas.openxmlformats.org/officeDocument/2006/math">
                     <m:oMathParaPr>
@@ -6809,7 +6473,7 @@
             </p:txBody>
           </p:sp>
         </mc:Choice>
-        <mc:Fallback>
+        <mc:Fallback xmlns="">
           <p:sp>
             <p:nvSpPr>
               <p:cNvPr id="28" name="TextBox 27">
@@ -6854,8 +6518,8 @@
           </p:sp>
         </mc:Fallback>
       </mc:AlternateContent>
-      <mc:AlternateContent xmlns:mc="http://schemas.openxmlformats.org/markup-compatibility/2006">
-        <mc:Choice xmlns:a14="http://schemas.microsoft.com/office/drawing/2010/main" Requires="a14">
+      <mc:AlternateContent xmlns:mc="http://schemas.openxmlformats.org/markup-compatibility/2006" xmlns:a14="http://schemas.microsoft.com/office/drawing/2010/main">
+        <mc:Choice Requires="a14">
           <p:sp>
             <p:nvSpPr>
               <p:cNvPr id="33" name="TextBox 32">
@@ -6884,6 +6548,7 @@
               </a:bodyPr>
               <a:lstStyle/>
               <a:p>
+                <a:pPr/>
                 <a14:m>
                   <m:oMathPara xmlns:m="http://schemas.openxmlformats.org/officeDocument/2006/math">
                     <m:oMathParaPr>
@@ -6904,7 +6569,7 @@
             </p:txBody>
           </p:sp>
         </mc:Choice>
-        <mc:Fallback>
+        <mc:Fallback xmlns="">
           <p:sp>
             <p:nvSpPr>
               <p:cNvPr id="33" name="TextBox 32">
@@ -6949,8 +6614,8 @@
           </p:sp>
         </mc:Fallback>
       </mc:AlternateContent>
-      <mc:AlternateContent xmlns:mc="http://schemas.openxmlformats.org/markup-compatibility/2006">
-        <mc:Choice xmlns:a14="http://schemas.microsoft.com/office/drawing/2010/main" Requires="a14">
+      <mc:AlternateContent xmlns:mc="http://schemas.openxmlformats.org/markup-compatibility/2006" xmlns:a14="http://schemas.microsoft.com/office/drawing/2010/main">
+        <mc:Choice Requires="a14">
           <p:sp>
             <p:nvSpPr>
               <p:cNvPr id="34" name="TextBox 33">
@@ -6979,6 +6644,7 @@
               </a:bodyPr>
               <a:lstStyle/>
               <a:p>
+                <a:pPr/>
                 <a14:m>
                   <m:oMathPara xmlns:m="http://schemas.openxmlformats.org/officeDocument/2006/math">
                     <m:oMathParaPr>
@@ -6999,7 +6665,7 @@
             </p:txBody>
           </p:sp>
         </mc:Choice>
-        <mc:Fallback>
+        <mc:Fallback xmlns="">
           <p:sp>
             <p:nvSpPr>
               <p:cNvPr id="34" name="TextBox 33">
@@ -7044,8 +6710,8 @@
           </p:sp>
         </mc:Fallback>
       </mc:AlternateContent>
-      <mc:AlternateContent xmlns:mc="http://schemas.openxmlformats.org/markup-compatibility/2006">
-        <mc:Choice xmlns:a14="http://schemas.microsoft.com/office/drawing/2010/main" Requires="a14">
+      <mc:AlternateContent xmlns:mc="http://schemas.openxmlformats.org/markup-compatibility/2006" xmlns:a14="http://schemas.microsoft.com/office/drawing/2010/main">
+        <mc:Choice Requires="a14">
           <p:sp>
             <p:nvSpPr>
               <p:cNvPr id="35" name="TextBox 34">
@@ -7074,6 +6740,7 @@
               </a:bodyPr>
               <a:lstStyle/>
               <a:p>
+                <a:pPr/>
                 <a14:m>
                   <m:oMathPara xmlns:m="http://schemas.openxmlformats.org/officeDocument/2006/math">
                     <m:oMathParaPr>
@@ -7094,7 +6761,7 @@
             </p:txBody>
           </p:sp>
         </mc:Choice>
-        <mc:Fallback>
+        <mc:Fallback xmlns="">
           <p:sp>
             <p:nvSpPr>
               <p:cNvPr id="35" name="TextBox 34">
@@ -7139,8 +6806,8 @@
           </p:sp>
         </mc:Fallback>
       </mc:AlternateContent>
-      <mc:AlternateContent xmlns:mc="http://schemas.openxmlformats.org/markup-compatibility/2006">
-        <mc:Choice xmlns:a14="http://schemas.microsoft.com/office/drawing/2010/main" Requires="a14">
+      <mc:AlternateContent xmlns:mc="http://schemas.openxmlformats.org/markup-compatibility/2006" xmlns:a14="http://schemas.microsoft.com/office/drawing/2010/main">
+        <mc:Choice Requires="a14">
           <p:sp>
             <p:nvSpPr>
               <p:cNvPr id="36" name="TextBox 35">
@@ -7169,6 +6836,7 @@
               </a:bodyPr>
               <a:lstStyle/>
               <a:p>
+                <a:pPr/>
                 <a14:m>
                   <m:oMathPara xmlns:m="http://schemas.openxmlformats.org/officeDocument/2006/math">
                     <m:oMathParaPr>
@@ -7189,7 +6857,7 @@
             </p:txBody>
           </p:sp>
         </mc:Choice>
-        <mc:Fallback>
+        <mc:Fallback xmlns="">
           <p:sp>
             <p:nvSpPr>
               <p:cNvPr id="36" name="TextBox 35">
@@ -7234,8 +6902,8 @@
           </p:sp>
         </mc:Fallback>
       </mc:AlternateContent>
-      <mc:AlternateContent xmlns:mc="http://schemas.openxmlformats.org/markup-compatibility/2006">
-        <mc:Choice xmlns:a14="http://schemas.microsoft.com/office/drawing/2010/main" Requires="a14">
+      <mc:AlternateContent xmlns:mc="http://schemas.openxmlformats.org/markup-compatibility/2006" xmlns:a14="http://schemas.microsoft.com/office/drawing/2010/main">
+        <mc:Choice Requires="a14">
           <p:sp>
             <p:nvSpPr>
               <p:cNvPr id="37" name="TextBox 36">
@@ -7264,6 +6932,7 @@
               </a:bodyPr>
               <a:lstStyle/>
               <a:p>
+                <a:pPr/>
                 <a14:m>
                   <m:oMathPara xmlns:m="http://schemas.openxmlformats.org/officeDocument/2006/math">
                     <m:oMathParaPr>
@@ -7284,7 +6953,7 @@
             </p:txBody>
           </p:sp>
         </mc:Choice>
-        <mc:Fallback>
+        <mc:Fallback xmlns="">
           <p:sp>
             <p:nvSpPr>
               <p:cNvPr id="37" name="TextBox 36">
@@ -7411,8 +7080,8 @@
           </a:fontRef>
         </p:style>
       </p:cxnSp>
-      <mc:AlternateContent xmlns:mc="http://schemas.openxmlformats.org/markup-compatibility/2006">
-        <mc:Choice xmlns:a14="http://schemas.microsoft.com/office/drawing/2010/main" Requires="a14">
+      <mc:AlternateContent xmlns:mc="http://schemas.openxmlformats.org/markup-compatibility/2006" xmlns:a14="http://schemas.microsoft.com/office/drawing/2010/main">
+        <mc:Choice Requires="a14">
           <p:sp>
             <p:nvSpPr>
               <p:cNvPr id="15" name="TextBox 14">
@@ -7441,6 +7110,7 @@
               </a:bodyPr>
               <a:lstStyle/>
               <a:p>
+                <a:pPr/>
                 <a14:m>
                   <m:oMathPara xmlns:m="http://schemas.openxmlformats.org/officeDocument/2006/math">
                     <m:oMathParaPr>
@@ -7607,7 +7277,7 @@
             </p:txBody>
           </p:sp>
         </mc:Choice>
-        <mc:Fallback>
+        <mc:Fallback xmlns="">
           <p:sp>
             <p:nvSpPr>
               <p:cNvPr id="15" name="TextBox 14">
@@ -8109,8 +7779,8 @@
           </a:p>
         </p:txBody>
       </p:sp>
-      <mc:AlternateContent xmlns:mc="http://schemas.openxmlformats.org/markup-compatibility/2006">
-        <mc:Choice xmlns:a14="http://schemas.microsoft.com/office/drawing/2010/main" Requires="a14">
+      <mc:AlternateContent xmlns:mc="http://schemas.openxmlformats.org/markup-compatibility/2006" xmlns:a14="http://schemas.microsoft.com/office/drawing/2010/main">
+        <mc:Choice Requires="a14">
           <p:sp>
             <p:nvSpPr>
               <p:cNvPr id="26" name="TextBox 25">
@@ -8139,6 +7809,7 @@
               </a:bodyPr>
               <a:lstStyle/>
               <a:p>
+                <a:pPr/>
                 <a14:m>
                   <m:oMathPara xmlns:m="http://schemas.openxmlformats.org/officeDocument/2006/math">
                     <m:oMathParaPr>
@@ -8159,7 +7830,7 @@
             </p:txBody>
           </p:sp>
         </mc:Choice>
-        <mc:Fallback>
+        <mc:Fallback xmlns="">
           <p:sp>
             <p:nvSpPr>
               <p:cNvPr id="26" name="TextBox 25">
@@ -8204,8 +7875,8 @@
           </p:sp>
         </mc:Fallback>
       </mc:AlternateContent>
-      <mc:AlternateContent xmlns:mc="http://schemas.openxmlformats.org/markup-compatibility/2006">
-        <mc:Choice xmlns:a14="http://schemas.microsoft.com/office/drawing/2010/main" Requires="a14">
+      <mc:AlternateContent xmlns:mc="http://schemas.openxmlformats.org/markup-compatibility/2006" xmlns:a14="http://schemas.microsoft.com/office/drawing/2010/main">
+        <mc:Choice Requires="a14">
           <p:sp>
             <p:nvSpPr>
               <p:cNvPr id="27" name="TextBox 26">
@@ -8234,6 +7905,7 @@
               </a:bodyPr>
               <a:lstStyle/>
               <a:p>
+                <a:pPr/>
                 <a14:m>
                   <m:oMathPara xmlns:m="http://schemas.openxmlformats.org/officeDocument/2006/math">
                     <m:oMathParaPr>
@@ -8254,7 +7926,7 @@
             </p:txBody>
           </p:sp>
         </mc:Choice>
-        <mc:Fallback>
+        <mc:Fallback xmlns="">
           <p:sp>
             <p:nvSpPr>
               <p:cNvPr id="27" name="TextBox 26">
@@ -8299,8 +7971,8 @@
           </p:sp>
         </mc:Fallback>
       </mc:AlternateContent>
-      <mc:AlternateContent xmlns:mc="http://schemas.openxmlformats.org/markup-compatibility/2006">
-        <mc:Choice xmlns:a14="http://schemas.microsoft.com/office/drawing/2010/main" Requires="a14">
+      <mc:AlternateContent xmlns:mc="http://schemas.openxmlformats.org/markup-compatibility/2006" xmlns:a14="http://schemas.microsoft.com/office/drawing/2010/main">
+        <mc:Choice Requires="a14">
           <p:sp>
             <p:nvSpPr>
               <p:cNvPr id="28" name="TextBox 27">
@@ -8329,6 +8001,7 @@
               </a:bodyPr>
               <a:lstStyle/>
               <a:p>
+                <a:pPr/>
                 <a14:m>
                   <m:oMathPara xmlns:m="http://schemas.openxmlformats.org/officeDocument/2006/math">
                     <m:oMathParaPr>
@@ -8349,7 +8022,7 @@
             </p:txBody>
           </p:sp>
         </mc:Choice>
-        <mc:Fallback>
+        <mc:Fallback xmlns="">
           <p:sp>
             <p:nvSpPr>
               <p:cNvPr id="28" name="TextBox 27">
@@ -8394,8 +8067,8 @@
           </p:sp>
         </mc:Fallback>
       </mc:AlternateContent>
-      <mc:AlternateContent xmlns:mc="http://schemas.openxmlformats.org/markup-compatibility/2006">
-        <mc:Choice xmlns:a14="http://schemas.microsoft.com/office/drawing/2010/main" Requires="a14">
+      <mc:AlternateContent xmlns:mc="http://schemas.openxmlformats.org/markup-compatibility/2006" xmlns:a14="http://schemas.microsoft.com/office/drawing/2010/main">
+        <mc:Choice Requires="a14">
           <p:sp>
             <p:nvSpPr>
               <p:cNvPr id="33" name="TextBox 32">
@@ -8424,6 +8097,7 @@
               </a:bodyPr>
               <a:lstStyle/>
               <a:p>
+                <a:pPr/>
                 <a14:m>
                   <m:oMathPara xmlns:m="http://schemas.openxmlformats.org/officeDocument/2006/math">
                     <m:oMathParaPr>
@@ -8444,7 +8118,7 @@
             </p:txBody>
           </p:sp>
         </mc:Choice>
-        <mc:Fallback>
+        <mc:Fallback xmlns="">
           <p:sp>
             <p:nvSpPr>
               <p:cNvPr id="33" name="TextBox 32">
@@ -8489,8 +8163,8 @@
           </p:sp>
         </mc:Fallback>
       </mc:AlternateContent>
-      <mc:AlternateContent xmlns:mc="http://schemas.openxmlformats.org/markup-compatibility/2006">
-        <mc:Choice xmlns:a14="http://schemas.microsoft.com/office/drawing/2010/main" Requires="a14">
+      <mc:AlternateContent xmlns:mc="http://schemas.openxmlformats.org/markup-compatibility/2006" xmlns:a14="http://schemas.microsoft.com/office/drawing/2010/main">
+        <mc:Choice Requires="a14">
           <p:sp>
             <p:nvSpPr>
               <p:cNvPr id="34" name="TextBox 33">
@@ -8519,6 +8193,7 @@
               </a:bodyPr>
               <a:lstStyle/>
               <a:p>
+                <a:pPr/>
                 <a14:m>
                   <m:oMathPara xmlns:m="http://schemas.openxmlformats.org/officeDocument/2006/math">
                     <m:oMathParaPr>
@@ -8539,7 +8214,7 @@
             </p:txBody>
           </p:sp>
         </mc:Choice>
-        <mc:Fallback>
+        <mc:Fallback xmlns="">
           <p:sp>
             <p:nvSpPr>
               <p:cNvPr id="34" name="TextBox 33">
@@ -8584,8 +8259,8 @@
           </p:sp>
         </mc:Fallback>
       </mc:AlternateContent>
-      <mc:AlternateContent xmlns:mc="http://schemas.openxmlformats.org/markup-compatibility/2006">
-        <mc:Choice xmlns:a14="http://schemas.microsoft.com/office/drawing/2010/main" Requires="a14">
+      <mc:AlternateContent xmlns:mc="http://schemas.openxmlformats.org/markup-compatibility/2006" xmlns:a14="http://schemas.microsoft.com/office/drawing/2010/main">
+        <mc:Choice Requires="a14">
           <p:sp>
             <p:nvSpPr>
               <p:cNvPr id="35" name="TextBox 34">
@@ -8614,6 +8289,7 @@
               </a:bodyPr>
               <a:lstStyle/>
               <a:p>
+                <a:pPr/>
                 <a14:m>
                   <m:oMathPara xmlns:m="http://schemas.openxmlformats.org/officeDocument/2006/math">
                     <m:oMathParaPr>
@@ -8634,7 +8310,7 @@
             </p:txBody>
           </p:sp>
         </mc:Choice>
-        <mc:Fallback>
+        <mc:Fallback xmlns="">
           <p:sp>
             <p:nvSpPr>
               <p:cNvPr id="35" name="TextBox 34">
@@ -8679,8 +8355,8 @@
           </p:sp>
         </mc:Fallback>
       </mc:AlternateContent>
-      <mc:AlternateContent xmlns:mc="http://schemas.openxmlformats.org/markup-compatibility/2006">
-        <mc:Choice xmlns:a14="http://schemas.microsoft.com/office/drawing/2010/main" Requires="a14">
+      <mc:AlternateContent xmlns:mc="http://schemas.openxmlformats.org/markup-compatibility/2006" xmlns:a14="http://schemas.microsoft.com/office/drawing/2010/main">
+        <mc:Choice Requires="a14">
           <p:sp>
             <p:nvSpPr>
               <p:cNvPr id="36" name="TextBox 35">
@@ -8709,6 +8385,7 @@
               </a:bodyPr>
               <a:lstStyle/>
               <a:p>
+                <a:pPr/>
                 <a14:m>
                   <m:oMathPara xmlns:m="http://schemas.openxmlformats.org/officeDocument/2006/math">
                     <m:oMathParaPr>
@@ -8729,7 +8406,7 @@
             </p:txBody>
           </p:sp>
         </mc:Choice>
-        <mc:Fallback>
+        <mc:Fallback xmlns="">
           <p:sp>
             <p:nvSpPr>
               <p:cNvPr id="36" name="TextBox 35">
@@ -8774,8 +8451,8 @@
           </p:sp>
         </mc:Fallback>
       </mc:AlternateContent>
-      <mc:AlternateContent xmlns:mc="http://schemas.openxmlformats.org/markup-compatibility/2006">
-        <mc:Choice xmlns:a14="http://schemas.microsoft.com/office/drawing/2010/main" Requires="a14">
+      <mc:AlternateContent xmlns:mc="http://schemas.openxmlformats.org/markup-compatibility/2006" xmlns:a14="http://schemas.microsoft.com/office/drawing/2010/main">
+        <mc:Choice Requires="a14">
           <p:sp>
             <p:nvSpPr>
               <p:cNvPr id="37" name="TextBox 36">
@@ -8804,6 +8481,7 @@
               </a:bodyPr>
               <a:lstStyle/>
               <a:p>
+                <a:pPr/>
                 <a14:m>
                   <m:oMathPara xmlns:m="http://schemas.openxmlformats.org/officeDocument/2006/math">
                     <m:oMathParaPr>
@@ -8824,7 +8502,7 @@
             </p:txBody>
           </p:sp>
         </mc:Choice>
-        <mc:Fallback>
+        <mc:Fallback xmlns="">
           <p:sp>
             <p:nvSpPr>
               <p:cNvPr id="37" name="TextBox 36">
@@ -8951,8 +8629,8 @@
           </a:fontRef>
         </p:style>
       </p:cxnSp>
-      <mc:AlternateContent xmlns:mc="http://schemas.openxmlformats.org/markup-compatibility/2006">
-        <mc:Choice xmlns:a14="http://schemas.microsoft.com/office/drawing/2010/main" Requires="a14">
+      <mc:AlternateContent xmlns:mc="http://schemas.openxmlformats.org/markup-compatibility/2006" xmlns:a14="http://schemas.microsoft.com/office/drawing/2010/main">
+        <mc:Choice Requires="a14">
           <p:sp>
             <p:nvSpPr>
               <p:cNvPr id="15" name="TextBox 14">
@@ -8981,6 +8659,7 @@
               </a:bodyPr>
               <a:lstStyle/>
               <a:p>
+                <a:pPr/>
                 <a14:m>
                   <m:oMathPara xmlns:m="http://schemas.openxmlformats.org/officeDocument/2006/math">
                     <m:oMathParaPr>
@@ -9135,7 +8814,7 @@
             </p:txBody>
           </p:sp>
         </mc:Choice>
-        <mc:Fallback>
+        <mc:Fallback xmlns="">
           <p:sp>
             <p:nvSpPr>
               <p:cNvPr id="15" name="TextBox 14">
@@ -9637,8 +9316,8 @@
           </a:p>
         </p:txBody>
       </p:sp>
-      <mc:AlternateContent xmlns:mc="http://schemas.openxmlformats.org/markup-compatibility/2006">
-        <mc:Choice xmlns:a14="http://schemas.microsoft.com/office/drawing/2010/main" Requires="a14">
+      <mc:AlternateContent xmlns:mc="http://schemas.openxmlformats.org/markup-compatibility/2006" xmlns:a14="http://schemas.microsoft.com/office/drawing/2010/main">
+        <mc:Choice Requires="a14">
           <p:sp>
             <p:nvSpPr>
               <p:cNvPr id="26" name="TextBox 25">
@@ -9667,6 +9346,7 @@
               </a:bodyPr>
               <a:lstStyle/>
               <a:p>
+                <a:pPr/>
                 <a14:m>
                   <m:oMathPara xmlns:m="http://schemas.openxmlformats.org/officeDocument/2006/math">
                     <m:oMathParaPr>
@@ -9687,7 +9367,7 @@
             </p:txBody>
           </p:sp>
         </mc:Choice>
-        <mc:Fallback>
+        <mc:Fallback xmlns="">
           <p:sp>
             <p:nvSpPr>
               <p:cNvPr id="26" name="TextBox 25">
@@ -9732,8 +9412,8 @@
           </p:sp>
         </mc:Fallback>
       </mc:AlternateContent>
-      <mc:AlternateContent xmlns:mc="http://schemas.openxmlformats.org/markup-compatibility/2006">
-        <mc:Choice xmlns:a14="http://schemas.microsoft.com/office/drawing/2010/main" Requires="a14">
+      <mc:AlternateContent xmlns:mc="http://schemas.openxmlformats.org/markup-compatibility/2006" xmlns:a14="http://schemas.microsoft.com/office/drawing/2010/main">
+        <mc:Choice Requires="a14">
           <p:sp>
             <p:nvSpPr>
               <p:cNvPr id="27" name="TextBox 26">
@@ -9762,6 +9442,7 @@
               </a:bodyPr>
               <a:lstStyle/>
               <a:p>
+                <a:pPr/>
                 <a14:m>
                   <m:oMathPara xmlns:m="http://schemas.openxmlformats.org/officeDocument/2006/math">
                     <m:oMathParaPr>
@@ -9782,7 +9463,7 @@
             </p:txBody>
           </p:sp>
         </mc:Choice>
-        <mc:Fallback>
+        <mc:Fallback xmlns="">
           <p:sp>
             <p:nvSpPr>
               <p:cNvPr id="27" name="TextBox 26">
@@ -9827,8 +9508,8 @@
           </p:sp>
         </mc:Fallback>
       </mc:AlternateContent>
-      <mc:AlternateContent xmlns:mc="http://schemas.openxmlformats.org/markup-compatibility/2006">
-        <mc:Choice xmlns:a14="http://schemas.microsoft.com/office/drawing/2010/main" Requires="a14">
+      <mc:AlternateContent xmlns:mc="http://schemas.openxmlformats.org/markup-compatibility/2006" xmlns:a14="http://schemas.microsoft.com/office/drawing/2010/main">
+        <mc:Choice Requires="a14">
           <p:sp>
             <p:nvSpPr>
               <p:cNvPr id="28" name="TextBox 27">
@@ -9857,6 +9538,7 @@
               </a:bodyPr>
               <a:lstStyle/>
               <a:p>
+                <a:pPr/>
                 <a14:m>
                   <m:oMathPara xmlns:m="http://schemas.openxmlformats.org/officeDocument/2006/math">
                     <m:oMathParaPr>
@@ -9877,7 +9559,7 @@
             </p:txBody>
           </p:sp>
         </mc:Choice>
-        <mc:Fallback>
+        <mc:Fallback xmlns="">
           <p:sp>
             <p:nvSpPr>
               <p:cNvPr id="28" name="TextBox 27">
@@ -9922,8 +9604,8 @@
           </p:sp>
         </mc:Fallback>
       </mc:AlternateContent>
-      <mc:AlternateContent xmlns:mc="http://schemas.openxmlformats.org/markup-compatibility/2006">
-        <mc:Choice xmlns:a14="http://schemas.microsoft.com/office/drawing/2010/main" Requires="a14">
+      <mc:AlternateContent xmlns:mc="http://schemas.openxmlformats.org/markup-compatibility/2006" xmlns:a14="http://schemas.microsoft.com/office/drawing/2010/main">
+        <mc:Choice Requires="a14">
           <p:sp>
             <p:nvSpPr>
               <p:cNvPr id="33" name="TextBox 32">
@@ -9952,6 +9634,7 @@
               </a:bodyPr>
               <a:lstStyle/>
               <a:p>
+                <a:pPr/>
                 <a14:m>
                   <m:oMathPara xmlns:m="http://schemas.openxmlformats.org/officeDocument/2006/math">
                     <m:oMathParaPr>
@@ -9972,7 +9655,7 @@
             </p:txBody>
           </p:sp>
         </mc:Choice>
-        <mc:Fallback>
+        <mc:Fallback xmlns="">
           <p:sp>
             <p:nvSpPr>
               <p:cNvPr id="33" name="TextBox 32">
@@ -10017,8 +9700,8 @@
           </p:sp>
         </mc:Fallback>
       </mc:AlternateContent>
-      <mc:AlternateContent xmlns:mc="http://schemas.openxmlformats.org/markup-compatibility/2006">
-        <mc:Choice xmlns:a14="http://schemas.microsoft.com/office/drawing/2010/main" Requires="a14">
+      <mc:AlternateContent xmlns:mc="http://schemas.openxmlformats.org/markup-compatibility/2006" xmlns:a14="http://schemas.microsoft.com/office/drawing/2010/main">
+        <mc:Choice Requires="a14">
           <p:sp>
             <p:nvSpPr>
               <p:cNvPr id="34" name="TextBox 33">
@@ -10047,6 +9730,7 @@
               </a:bodyPr>
               <a:lstStyle/>
               <a:p>
+                <a:pPr/>
                 <a14:m>
                   <m:oMathPara xmlns:m="http://schemas.openxmlformats.org/officeDocument/2006/math">
                     <m:oMathParaPr>
@@ -10067,7 +9751,7 @@
             </p:txBody>
           </p:sp>
         </mc:Choice>
-        <mc:Fallback>
+        <mc:Fallback xmlns="">
           <p:sp>
             <p:nvSpPr>
               <p:cNvPr id="34" name="TextBox 33">
@@ -10112,8 +9796,8 @@
           </p:sp>
         </mc:Fallback>
       </mc:AlternateContent>
-      <mc:AlternateContent xmlns:mc="http://schemas.openxmlformats.org/markup-compatibility/2006">
-        <mc:Choice xmlns:a14="http://schemas.microsoft.com/office/drawing/2010/main" Requires="a14">
+      <mc:AlternateContent xmlns:mc="http://schemas.openxmlformats.org/markup-compatibility/2006" xmlns:a14="http://schemas.microsoft.com/office/drawing/2010/main">
+        <mc:Choice Requires="a14">
           <p:sp>
             <p:nvSpPr>
               <p:cNvPr id="35" name="TextBox 34">
@@ -10142,6 +9826,7 @@
               </a:bodyPr>
               <a:lstStyle/>
               <a:p>
+                <a:pPr/>
                 <a14:m>
                   <m:oMathPara xmlns:m="http://schemas.openxmlformats.org/officeDocument/2006/math">
                     <m:oMathParaPr>
@@ -10162,7 +9847,7 @@
             </p:txBody>
           </p:sp>
         </mc:Choice>
-        <mc:Fallback>
+        <mc:Fallback xmlns="">
           <p:sp>
             <p:nvSpPr>
               <p:cNvPr id="35" name="TextBox 34">
@@ -10207,8 +9892,8 @@
           </p:sp>
         </mc:Fallback>
       </mc:AlternateContent>
-      <mc:AlternateContent xmlns:mc="http://schemas.openxmlformats.org/markup-compatibility/2006">
-        <mc:Choice xmlns:a14="http://schemas.microsoft.com/office/drawing/2010/main" Requires="a14">
+      <mc:AlternateContent xmlns:mc="http://schemas.openxmlformats.org/markup-compatibility/2006" xmlns:a14="http://schemas.microsoft.com/office/drawing/2010/main">
+        <mc:Choice Requires="a14">
           <p:sp>
             <p:nvSpPr>
               <p:cNvPr id="36" name="TextBox 35">
@@ -10237,6 +9922,7 @@
               </a:bodyPr>
               <a:lstStyle/>
               <a:p>
+                <a:pPr/>
                 <a14:m>
                   <m:oMathPara xmlns:m="http://schemas.openxmlformats.org/officeDocument/2006/math">
                     <m:oMathParaPr>
@@ -10257,7 +9943,7 @@
             </p:txBody>
           </p:sp>
         </mc:Choice>
-        <mc:Fallback>
+        <mc:Fallback xmlns="">
           <p:sp>
             <p:nvSpPr>
               <p:cNvPr id="36" name="TextBox 35">
@@ -10302,8 +9988,8 @@
           </p:sp>
         </mc:Fallback>
       </mc:AlternateContent>
-      <mc:AlternateContent xmlns:mc="http://schemas.openxmlformats.org/markup-compatibility/2006">
-        <mc:Choice xmlns:a14="http://schemas.microsoft.com/office/drawing/2010/main" Requires="a14">
+      <mc:AlternateContent xmlns:mc="http://schemas.openxmlformats.org/markup-compatibility/2006" xmlns:a14="http://schemas.microsoft.com/office/drawing/2010/main">
+        <mc:Choice Requires="a14">
           <p:sp>
             <p:nvSpPr>
               <p:cNvPr id="37" name="TextBox 36">
@@ -10332,6 +10018,7 @@
               </a:bodyPr>
               <a:lstStyle/>
               <a:p>
+                <a:pPr/>
                 <a14:m>
                   <m:oMathPara xmlns:m="http://schemas.openxmlformats.org/officeDocument/2006/math">
                     <m:oMathParaPr>
@@ -10352,7 +10039,7 @@
             </p:txBody>
           </p:sp>
         </mc:Choice>
-        <mc:Fallback>
+        <mc:Fallback xmlns="">
           <p:sp>
             <p:nvSpPr>
               <p:cNvPr id="37" name="TextBox 36">
@@ -10479,8 +10166,8 @@
           </a:fontRef>
         </p:style>
       </p:cxnSp>
-      <mc:AlternateContent xmlns:mc="http://schemas.openxmlformats.org/markup-compatibility/2006">
-        <mc:Choice xmlns:a14="http://schemas.microsoft.com/office/drawing/2010/main" Requires="a14">
+      <mc:AlternateContent xmlns:mc="http://schemas.openxmlformats.org/markup-compatibility/2006" xmlns:a14="http://schemas.microsoft.com/office/drawing/2010/main">
+        <mc:Choice Requires="a14">
           <p:sp>
             <p:nvSpPr>
               <p:cNvPr id="15" name="TextBox 14">
@@ -10509,6 +10196,7 @@
               </a:bodyPr>
               <a:lstStyle/>
               <a:p>
+                <a:pPr/>
                 <a14:m>
                   <m:oMathPara xmlns:m="http://schemas.openxmlformats.org/officeDocument/2006/math">
                     <m:oMathParaPr>
@@ -10669,7 +10357,7 @@
             </p:txBody>
           </p:sp>
         </mc:Choice>
-        <mc:Fallback>
+        <mc:Fallback xmlns="">
           <p:sp>
             <p:nvSpPr>
               <p:cNvPr id="15" name="TextBox 14">
@@ -10718,6 +10406,2448 @@
     <p:extLst>
       <p:ext uri="{BB962C8B-B14F-4D97-AF65-F5344CB8AC3E}">
         <p14:creationId xmlns:p14="http://schemas.microsoft.com/office/powerpoint/2010/main" val="1213404053"/>
+      </p:ext>
+    </p:extLst>
+  </p:cSld>
+  <p:clrMapOvr>
+    <a:masterClrMapping/>
+  </p:clrMapOvr>
+</p:sld>
+</file>
+
+<file path=ppt/slides/slide6.xml><?xml version="1.0" encoding="utf-8"?>
+<p:sld xmlns:a="http://schemas.openxmlformats.org/drawingml/2006/main" xmlns:r="http://schemas.openxmlformats.org/officeDocument/2006/relationships" xmlns:p="http://schemas.openxmlformats.org/presentationml/2006/main">
+  <p:cSld>
+    <p:spTree>
+      <p:nvGrpSpPr>
+        <p:cNvPr id="1" name=""/>
+        <p:cNvGrpSpPr/>
+        <p:nvPr/>
+      </p:nvGrpSpPr>
+      <p:grpSpPr>
+        <a:xfrm>
+          <a:off x="0" y="0"/>
+          <a:ext cx="0" cy="0"/>
+          <a:chOff x="0" y="0"/>
+          <a:chExt cx="0" cy="0"/>
+        </a:xfrm>
+      </p:grpSpPr>
+      <p:sp>
+        <p:nvSpPr>
+          <p:cNvPr id="54" name="Freeform: Shape 53">
+            <a:extLst>
+              <a:ext uri="{FF2B5EF4-FFF2-40B4-BE49-F238E27FC236}">
+                <a16:creationId xmlns:a16="http://schemas.microsoft.com/office/drawing/2014/main" id="{5B3A51CF-BC97-4875-B45E-2E3C2936930C}"/>
+              </a:ext>
+            </a:extLst>
+          </p:cNvPr>
+          <p:cNvSpPr/>
+          <p:nvPr/>
+        </p:nvSpPr>
+        <p:spPr>
+          <a:xfrm rot="10800000">
+            <a:off x="388512" y="1124324"/>
+            <a:ext cx="3773096" cy="3769112"/>
+          </a:xfrm>
+          <a:custGeom>
+            <a:avLst/>
+            <a:gdLst>
+              <a:gd name="connsiteX0" fmla="*/ 0 w 3773096"/>
+              <a:gd name="connsiteY0" fmla="*/ 3715771 h 3769112"/>
+              <a:gd name="connsiteX1" fmla="*/ 0 w 3773096"/>
+              <a:gd name="connsiteY1" fmla="*/ 3502413 h 3769112"/>
+              <a:gd name="connsiteX2" fmla="*/ 53341 w 3773096"/>
+              <a:gd name="connsiteY2" fmla="*/ 3449072 h 3769112"/>
+              <a:gd name="connsiteX3" fmla="*/ 3453056 w 3773096"/>
+              <a:gd name="connsiteY3" fmla="*/ 3449072 h 3769112"/>
+              <a:gd name="connsiteX4" fmla="*/ 3453056 w 3773096"/>
+              <a:gd name="connsiteY4" fmla="*/ 53341 h 3769112"/>
+              <a:gd name="connsiteX5" fmla="*/ 3506397 w 3773096"/>
+              <a:gd name="connsiteY5" fmla="*/ 0 h 3769112"/>
+              <a:gd name="connsiteX6" fmla="*/ 3719755 w 3773096"/>
+              <a:gd name="connsiteY6" fmla="*/ 0 h 3769112"/>
+              <a:gd name="connsiteX7" fmla="*/ 3773096 w 3773096"/>
+              <a:gd name="connsiteY7" fmla="*/ 53341 h 3769112"/>
+              <a:gd name="connsiteX8" fmla="*/ 3773096 w 3773096"/>
+              <a:gd name="connsiteY8" fmla="*/ 3715771 h 3769112"/>
+              <a:gd name="connsiteX9" fmla="*/ 3719755 w 3773096"/>
+              <a:gd name="connsiteY9" fmla="*/ 3769112 h 3769112"/>
+              <a:gd name="connsiteX10" fmla="*/ 3715771 w 3773096"/>
+              <a:gd name="connsiteY10" fmla="*/ 3769112 h 3769112"/>
+              <a:gd name="connsiteX11" fmla="*/ 3506397 w 3773096"/>
+              <a:gd name="connsiteY11" fmla="*/ 3769112 h 3769112"/>
+              <a:gd name="connsiteX12" fmla="*/ 53341 w 3773096"/>
+              <a:gd name="connsiteY12" fmla="*/ 3769112 h 3769112"/>
+              <a:gd name="connsiteX13" fmla="*/ 0 w 3773096"/>
+              <a:gd name="connsiteY13" fmla="*/ 3715771 h 3769112"/>
+            </a:gdLst>
+            <a:ahLst/>
+            <a:cxnLst>
+              <a:cxn ang="0">
+                <a:pos x="connsiteX0" y="connsiteY0"/>
+              </a:cxn>
+              <a:cxn ang="0">
+                <a:pos x="connsiteX1" y="connsiteY1"/>
+              </a:cxn>
+              <a:cxn ang="0">
+                <a:pos x="connsiteX2" y="connsiteY2"/>
+              </a:cxn>
+              <a:cxn ang="0">
+                <a:pos x="connsiteX3" y="connsiteY3"/>
+              </a:cxn>
+              <a:cxn ang="0">
+                <a:pos x="connsiteX4" y="connsiteY4"/>
+              </a:cxn>
+              <a:cxn ang="0">
+                <a:pos x="connsiteX5" y="connsiteY5"/>
+              </a:cxn>
+              <a:cxn ang="0">
+                <a:pos x="connsiteX6" y="connsiteY6"/>
+              </a:cxn>
+              <a:cxn ang="0">
+                <a:pos x="connsiteX7" y="connsiteY7"/>
+              </a:cxn>
+              <a:cxn ang="0">
+                <a:pos x="connsiteX8" y="connsiteY8"/>
+              </a:cxn>
+              <a:cxn ang="0">
+                <a:pos x="connsiteX9" y="connsiteY9"/>
+              </a:cxn>
+              <a:cxn ang="0">
+                <a:pos x="connsiteX10" y="connsiteY10"/>
+              </a:cxn>
+              <a:cxn ang="0">
+                <a:pos x="connsiteX11" y="connsiteY11"/>
+              </a:cxn>
+              <a:cxn ang="0">
+                <a:pos x="connsiteX12" y="connsiteY12"/>
+              </a:cxn>
+              <a:cxn ang="0">
+                <a:pos x="connsiteX13" y="connsiteY13"/>
+              </a:cxn>
+            </a:cxnLst>
+            <a:rect l="l" t="t" r="r" b="b"/>
+            <a:pathLst>
+              <a:path w="3773096" h="3769112">
+                <a:moveTo>
+                  <a:pt x="0" y="3715771"/>
+                </a:moveTo>
+                <a:lnTo>
+                  <a:pt x="0" y="3502413"/>
+                </a:lnTo>
+                <a:cubicBezTo>
+                  <a:pt x="0" y="3472954"/>
+                  <a:pt x="23882" y="3449072"/>
+                  <a:pt x="53341" y="3449072"/>
+                </a:cubicBezTo>
+                <a:lnTo>
+                  <a:pt x="3453056" y="3449072"/>
+                </a:lnTo>
+                <a:lnTo>
+                  <a:pt x="3453056" y="53341"/>
+                </a:lnTo>
+                <a:cubicBezTo>
+                  <a:pt x="3453056" y="23882"/>
+                  <a:pt x="3476938" y="0"/>
+                  <a:pt x="3506397" y="0"/>
+                </a:cubicBezTo>
+                <a:lnTo>
+                  <a:pt x="3719755" y="0"/>
+                </a:lnTo>
+                <a:cubicBezTo>
+                  <a:pt x="3749214" y="0"/>
+                  <a:pt x="3773096" y="23882"/>
+                  <a:pt x="3773096" y="53341"/>
+                </a:cubicBezTo>
+                <a:lnTo>
+                  <a:pt x="3773096" y="3715771"/>
+                </a:lnTo>
+                <a:cubicBezTo>
+                  <a:pt x="3773096" y="3745230"/>
+                  <a:pt x="3749214" y="3769112"/>
+                  <a:pt x="3719755" y="3769112"/>
+                </a:cubicBezTo>
+                <a:lnTo>
+                  <a:pt x="3715771" y="3769112"/>
+                </a:lnTo>
+                <a:lnTo>
+                  <a:pt x="3506397" y="3769112"/>
+                </a:lnTo>
+                <a:lnTo>
+                  <a:pt x="53341" y="3769112"/>
+                </a:lnTo>
+                <a:cubicBezTo>
+                  <a:pt x="23882" y="3769112"/>
+                  <a:pt x="0" y="3745230"/>
+                  <a:pt x="0" y="3715771"/>
+                </a:cubicBezTo>
+                <a:close/>
+              </a:path>
+            </a:pathLst>
+          </a:custGeom>
+          <a:solidFill>
+            <a:srgbClr val="00B0F0">
+              <a:alpha val="40000"/>
+            </a:srgbClr>
+          </a:solidFill>
+          <a:ln>
+            <a:noFill/>
+          </a:ln>
+        </p:spPr>
+        <p:style>
+          <a:lnRef idx="2">
+            <a:schemeClr val="accent1">
+              <a:shade val="50000"/>
+            </a:schemeClr>
+          </a:lnRef>
+          <a:fillRef idx="1">
+            <a:schemeClr val="accent1"/>
+          </a:fillRef>
+          <a:effectRef idx="0">
+            <a:schemeClr val="accent1"/>
+          </a:effectRef>
+          <a:fontRef idx="minor">
+            <a:schemeClr val="lt1"/>
+          </a:fontRef>
+        </p:style>
+        <p:txBody>
+          <a:bodyPr wrap="square" rtlCol="0" anchor="ctr">
+            <a:noAutofit/>
+          </a:bodyPr>
+          <a:lstStyle/>
+          <a:p>
+            <a:pPr algn="ctr"/>
+            <a:endParaRPr lang="en-US"/>
+          </a:p>
+        </p:txBody>
+      </p:sp>
+      <p:sp>
+        <p:nvSpPr>
+          <p:cNvPr id="25" name="Rectangle 24">
+            <a:extLst>
+              <a:ext uri="{FF2B5EF4-FFF2-40B4-BE49-F238E27FC236}">
+                <a16:creationId xmlns:a16="http://schemas.microsoft.com/office/drawing/2014/main" id="{E72E057D-6B0E-4C1C-A242-A10E8682E3A7}"/>
+              </a:ext>
+            </a:extLst>
+          </p:cNvPr>
+          <p:cNvSpPr/>
+          <p:nvPr/>
+        </p:nvSpPr>
+        <p:spPr>
+          <a:xfrm>
+            <a:off x="876790" y="1602392"/>
+            <a:ext cx="2796540" cy="2796540"/>
+          </a:xfrm>
+          <a:prstGeom prst="rect">
+            <a:avLst/>
+          </a:prstGeom>
+          <a:ln w="25400">
+            <a:solidFill>
+              <a:schemeClr val="tx1"/>
+            </a:solidFill>
+          </a:ln>
+        </p:spPr>
+        <p:style>
+          <a:lnRef idx="2">
+            <a:schemeClr val="accent6"/>
+          </a:lnRef>
+          <a:fillRef idx="1">
+            <a:schemeClr val="lt1"/>
+          </a:fillRef>
+          <a:effectRef idx="0">
+            <a:schemeClr val="accent6"/>
+          </a:effectRef>
+          <a:fontRef idx="minor">
+            <a:schemeClr val="dk1"/>
+          </a:fontRef>
+        </p:style>
+        <p:txBody>
+          <a:bodyPr rtlCol="0" anchor="ctr"/>
+          <a:lstStyle/>
+          <a:p>
+            <a:pPr algn="ctr"/>
+            <a:endParaRPr lang="en-US"/>
+          </a:p>
+        </p:txBody>
+      </p:sp>
+      <mc:AlternateContent xmlns:mc="http://schemas.openxmlformats.org/markup-compatibility/2006">
+        <mc:Choice xmlns:a14="http://schemas.microsoft.com/office/drawing/2010/main" Requires="a14">
+          <p:sp>
+            <p:nvSpPr>
+              <p:cNvPr id="26" name="TextBox 25">
+                <a:extLst>
+                  <a:ext uri="{FF2B5EF4-FFF2-40B4-BE49-F238E27FC236}">
+                    <a16:creationId xmlns:a16="http://schemas.microsoft.com/office/drawing/2014/main" id="{BDAE295A-C2D5-4ADD-9360-3694560520E5}"/>
+                  </a:ext>
+                </a:extLst>
+              </p:cNvPr>
+              <p:cNvSpPr txBox="1"/>
+              <p:nvPr/>
+            </p:nvSpPr>
+            <p:spPr>
+              <a:xfrm>
+                <a:off x="1930287" y="1054100"/>
+                <a:ext cx="681926" cy="461665"/>
+              </a:xfrm>
+              <a:prstGeom prst="rect">
+                <a:avLst/>
+              </a:prstGeom>
+              <a:noFill/>
+            </p:spPr>
+            <p:txBody>
+              <a:bodyPr wrap="square" rtlCol="0">
+                <a:spAutoFit/>
+              </a:bodyPr>
+              <a:lstStyle/>
+              <a:p>
+                <a:pPr/>
+                <a14:m>
+                  <m:oMathPara xmlns:m="http://schemas.openxmlformats.org/officeDocument/2006/math">
+                    <m:oMathParaPr>
+                      <m:jc m:val="centerGroup"/>
+                    </m:oMathParaPr>
+                    <m:oMath xmlns:m="http://schemas.openxmlformats.org/officeDocument/2006/math">
+                      <m:r>
+                        <a:rPr lang="en-US" sz="2400" b="0" i="1" smtClean="0">
+                          <a:latin typeface="Cambria Math" panose="02040503050406030204" pitchFamily="18" charset="0"/>
+                        </a:rPr>
+                        <m:t>𝐹</m:t>
+                      </m:r>
+                    </m:oMath>
+                  </m:oMathPara>
+                </a14:m>
+                <a:endParaRPr lang="en-US" sz="2400" dirty="0"/>
+              </a:p>
+            </p:txBody>
+          </p:sp>
+        </mc:Choice>
+        <mc:Fallback>
+          <p:sp>
+            <p:nvSpPr>
+              <p:cNvPr id="26" name="TextBox 25">
+                <a:extLst>
+                  <a:ext uri="{FF2B5EF4-FFF2-40B4-BE49-F238E27FC236}">
+                    <a16:creationId xmlns:a16="http://schemas.microsoft.com/office/drawing/2014/main" id="{BDAE295A-C2D5-4ADD-9360-3694560520E5}"/>
+                  </a:ext>
+                </a:extLst>
+              </p:cNvPr>
+              <p:cNvSpPr txBox="1">
+                <a:spLocks noRot="1" noChangeAspect="1" noMove="1" noResize="1" noEditPoints="1" noAdjustHandles="1" noChangeArrowheads="1" noChangeShapeType="1" noTextEdit="1"/>
+              </p:cNvSpPr>
+              <p:nvPr/>
+            </p:nvSpPr>
+            <p:spPr>
+              <a:xfrm>
+                <a:off x="1930287" y="1054100"/>
+                <a:ext cx="681926" cy="461665"/>
+              </a:xfrm>
+              <a:prstGeom prst="rect">
+                <a:avLst/>
+              </a:prstGeom>
+              <a:blipFill>
+                <a:blip r:embed="rId2"/>
+                <a:stretch>
+                  <a:fillRect/>
+                </a:stretch>
+              </a:blipFill>
+            </p:spPr>
+            <p:txBody>
+              <a:bodyPr/>
+              <a:lstStyle/>
+              <a:p>
+                <a:r>
+                  <a:rPr lang="en-US">
+                    <a:noFill/>
+                  </a:rPr>
+                  <a:t> </a:t>
+                </a:r>
+              </a:p>
+            </p:txBody>
+          </p:sp>
+        </mc:Fallback>
+      </mc:AlternateContent>
+      <mc:AlternateContent xmlns:mc="http://schemas.openxmlformats.org/markup-compatibility/2006">
+        <mc:Choice xmlns:a14="http://schemas.microsoft.com/office/drawing/2010/main" Requires="a14">
+          <p:sp>
+            <p:nvSpPr>
+              <p:cNvPr id="27" name="TextBox 26">
+                <a:extLst>
+                  <a:ext uri="{FF2B5EF4-FFF2-40B4-BE49-F238E27FC236}">
+                    <a16:creationId xmlns:a16="http://schemas.microsoft.com/office/drawing/2014/main" id="{445EA6A4-B880-4CBB-B70B-EE9D02F72A81}"/>
+                  </a:ext>
+                </a:extLst>
+              </p:cNvPr>
+              <p:cNvSpPr txBox="1"/>
+              <p:nvPr/>
+            </p:nvSpPr>
+            <p:spPr>
+              <a:xfrm>
+                <a:off x="3637710" y="1054100"/>
+                <a:ext cx="681926" cy="461665"/>
+              </a:xfrm>
+              <a:prstGeom prst="rect">
+                <a:avLst/>
+              </a:prstGeom>
+              <a:noFill/>
+            </p:spPr>
+            <p:txBody>
+              <a:bodyPr wrap="square" rtlCol="0">
+                <a:spAutoFit/>
+              </a:bodyPr>
+              <a:lstStyle/>
+              <a:p>
+                <a:pPr/>
+                <a14:m>
+                  <m:oMathPara xmlns:m="http://schemas.openxmlformats.org/officeDocument/2006/math">
+                    <m:oMathParaPr>
+                      <m:jc m:val="centerGroup"/>
+                    </m:oMathParaPr>
+                    <m:oMath xmlns:m="http://schemas.openxmlformats.org/officeDocument/2006/math">
+                      <m:r>
+                        <a:rPr lang="en-US" sz="2400" b="0" i="1" smtClean="0">
+                          <a:latin typeface="Cambria Math" panose="02040503050406030204" pitchFamily="18" charset="0"/>
+                        </a:rPr>
+                        <m:t>𝑇</m:t>
+                      </m:r>
+                    </m:oMath>
+                  </m:oMathPara>
+                </a14:m>
+                <a:endParaRPr lang="en-US" sz="2400" dirty="0"/>
+              </a:p>
+            </p:txBody>
+          </p:sp>
+        </mc:Choice>
+        <mc:Fallback>
+          <p:sp>
+            <p:nvSpPr>
+              <p:cNvPr id="27" name="TextBox 26">
+                <a:extLst>
+                  <a:ext uri="{FF2B5EF4-FFF2-40B4-BE49-F238E27FC236}">
+                    <a16:creationId xmlns:a16="http://schemas.microsoft.com/office/drawing/2014/main" id="{445EA6A4-B880-4CBB-B70B-EE9D02F72A81}"/>
+                  </a:ext>
+                </a:extLst>
+              </p:cNvPr>
+              <p:cNvSpPr txBox="1">
+                <a:spLocks noRot="1" noChangeAspect="1" noMove="1" noResize="1" noEditPoints="1" noAdjustHandles="1" noChangeArrowheads="1" noChangeShapeType="1" noTextEdit="1"/>
+              </p:cNvSpPr>
+              <p:nvPr/>
+            </p:nvSpPr>
+            <p:spPr>
+              <a:xfrm>
+                <a:off x="3637710" y="1054100"/>
+                <a:ext cx="681926" cy="461665"/>
+              </a:xfrm>
+              <a:prstGeom prst="rect">
+                <a:avLst/>
+              </a:prstGeom>
+              <a:blipFill>
+                <a:blip r:embed="rId3"/>
+                <a:stretch>
+                  <a:fillRect/>
+                </a:stretch>
+              </a:blipFill>
+            </p:spPr>
+            <p:txBody>
+              <a:bodyPr/>
+              <a:lstStyle/>
+              <a:p>
+                <a:r>
+                  <a:rPr lang="en-US">
+                    <a:noFill/>
+                  </a:rPr>
+                  <a:t> </a:t>
+                </a:r>
+              </a:p>
+            </p:txBody>
+          </p:sp>
+        </mc:Fallback>
+      </mc:AlternateContent>
+      <mc:AlternateContent xmlns:mc="http://schemas.openxmlformats.org/markup-compatibility/2006">
+        <mc:Choice xmlns:a14="http://schemas.microsoft.com/office/drawing/2010/main" Requires="a14">
+          <p:sp>
+            <p:nvSpPr>
+              <p:cNvPr id="28" name="TextBox 27">
+                <a:extLst>
+                  <a:ext uri="{FF2B5EF4-FFF2-40B4-BE49-F238E27FC236}">
+                    <a16:creationId xmlns:a16="http://schemas.microsoft.com/office/drawing/2014/main" id="{09D1C226-719B-48E2-8742-7BAD0EBA3CA3}"/>
+                  </a:ext>
+                </a:extLst>
+              </p:cNvPr>
+              <p:cNvSpPr txBox="1"/>
+              <p:nvPr/>
+            </p:nvSpPr>
+            <p:spPr>
+              <a:xfrm>
+                <a:off x="222864" y="1054100"/>
+                <a:ext cx="681926" cy="461665"/>
+              </a:xfrm>
+              <a:prstGeom prst="rect">
+                <a:avLst/>
+              </a:prstGeom>
+              <a:noFill/>
+            </p:spPr>
+            <p:txBody>
+              <a:bodyPr wrap="square" rtlCol="0">
+                <a:spAutoFit/>
+              </a:bodyPr>
+              <a:lstStyle/>
+              <a:p>
+                <a:pPr/>
+                <a14:m>
+                  <m:oMathPara xmlns:m="http://schemas.openxmlformats.org/officeDocument/2006/math">
+                    <m:oMathParaPr>
+                      <m:jc m:val="centerGroup"/>
+                    </m:oMathParaPr>
+                    <m:oMath xmlns:m="http://schemas.openxmlformats.org/officeDocument/2006/math">
+                      <m:r>
+                        <a:rPr lang="en-US" sz="2400" b="0" i="1" smtClean="0">
+                          <a:latin typeface="Cambria Math" panose="02040503050406030204" pitchFamily="18" charset="0"/>
+                        </a:rPr>
+                        <m:t>𝑉</m:t>
+                      </m:r>
+                    </m:oMath>
+                  </m:oMathPara>
+                </a14:m>
+                <a:endParaRPr lang="en-US" sz="2400" dirty="0"/>
+              </a:p>
+            </p:txBody>
+          </p:sp>
+        </mc:Choice>
+        <mc:Fallback>
+          <p:sp>
+            <p:nvSpPr>
+              <p:cNvPr id="28" name="TextBox 27">
+                <a:extLst>
+                  <a:ext uri="{FF2B5EF4-FFF2-40B4-BE49-F238E27FC236}">
+                    <a16:creationId xmlns:a16="http://schemas.microsoft.com/office/drawing/2014/main" id="{09D1C226-719B-48E2-8742-7BAD0EBA3CA3}"/>
+                  </a:ext>
+                </a:extLst>
+              </p:cNvPr>
+              <p:cNvSpPr txBox="1">
+                <a:spLocks noRot="1" noChangeAspect="1" noMove="1" noResize="1" noEditPoints="1" noAdjustHandles="1" noChangeArrowheads="1" noChangeShapeType="1" noTextEdit="1"/>
+              </p:cNvSpPr>
+              <p:nvPr/>
+            </p:nvSpPr>
+            <p:spPr>
+              <a:xfrm>
+                <a:off x="222864" y="1054100"/>
+                <a:ext cx="681926" cy="461665"/>
+              </a:xfrm>
+              <a:prstGeom prst="rect">
+                <a:avLst/>
+              </a:prstGeom>
+              <a:blipFill>
+                <a:blip r:embed="rId4"/>
+                <a:stretch>
+                  <a:fillRect/>
+                </a:stretch>
+              </a:blipFill>
+            </p:spPr>
+            <p:txBody>
+              <a:bodyPr/>
+              <a:lstStyle/>
+              <a:p>
+                <a:r>
+                  <a:rPr lang="en-US">
+                    <a:noFill/>
+                  </a:rPr>
+                  <a:t> </a:t>
+                </a:r>
+              </a:p>
+            </p:txBody>
+          </p:sp>
+        </mc:Fallback>
+      </mc:AlternateContent>
+      <mc:AlternateContent xmlns:mc="http://schemas.openxmlformats.org/markup-compatibility/2006">
+        <mc:Choice xmlns:a14="http://schemas.microsoft.com/office/drawing/2010/main" Requires="a14">
+          <p:sp>
+            <p:nvSpPr>
+              <p:cNvPr id="33" name="TextBox 32">
+                <a:extLst>
+                  <a:ext uri="{FF2B5EF4-FFF2-40B4-BE49-F238E27FC236}">
+                    <a16:creationId xmlns:a16="http://schemas.microsoft.com/office/drawing/2014/main" id="{858AD5B1-3D50-4DAB-97DB-41BFCAB2F96D}"/>
+                  </a:ext>
+                </a:extLst>
+              </p:cNvPr>
+              <p:cNvSpPr txBox="1"/>
+              <p:nvPr/>
+            </p:nvSpPr>
+            <p:spPr>
+              <a:xfrm>
+                <a:off x="3637710" y="2772236"/>
+                <a:ext cx="681926" cy="461665"/>
+              </a:xfrm>
+              <a:prstGeom prst="rect">
+                <a:avLst/>
+              </a:prstGeom>
+              <a:noFill/>
+            </p:spPr>
+            <p:txBody>
+              <a:bodyPr wrap="square" rtlCol="0">
+                <a:spAutoFit/>
+              </a:bodyPr>
+              <a:lstStyle/>
+              <a:p>
+                <a:pPr/>
+                <a14:m>
+                  <m:oMathPara xmlns:m="http://schemas.openxmlformats.org/officeDocument/2006/math">
+                    <m:oMathParaPr>
+                      <m:jc m:val="centerGroup"/>
+                    </m:oMathParaPr>
+                    <m:oMath xmlns:m="http://schemas.openxmlformats.org/officeDocument/2006/math">
+                      <m:r>
+                        <a:rPr lang="en-US" sz="2400" b="0" i="1" smtClean="0">
+                          <a:latin typeface="Cambria Math" panose="02040503050406030204" pitchFamily="18" charset="0"/>
+                        </a:rPr>
+                        <m:t>𝐺</m:t>
+                      </m:r>
+                    </m:oMath>
+                  </m:oMathPara>
+                </a14:m>
+                <a:endParaRPr lang="en-US" sz="2400" dirty="0"/>
+              </a:p>
+            </p:txBody>
+          </p:sp>
+        </mc:Choice>
+        <mc:Fallback>
+          <p:sp>
+            <p:nvSpPr>
+              <p:cNvPr id="33" name="TextBox 32">
+                <a:extLst>
+                  <a:ext uri="{FF2B5EF4-FFF2-40B4-BE49-F238E27FC236}">
+                    <a16:creationId xmlns:a16="http://schemas.microsoft.com/office/drawing/2014/main" id="{858AD5B1-3D50-4DAB-97DB-41BFCAB2F96D}"/>
+                  </a:ext>
+                </a:extLst>
+              </p:cNvPr>
+              <p:cNvSpPr txBox="1">
+                <a:spLocks noRot="1" noChangeAspect="1" noMove="1" noResize="1" noEditPoints="1" noAdjustHandles="1" noChangeArrowheads="1" noChangeShapeType="1" noTextEdit="1"/>
+              </p:cNvSpPr>
+              <p:nvPr/>
+            </p:nvSpPr>
+            <p:spPr>
+              <a:xfrm>
+                <a:off x="3637710" y="2772236"/>
+                <a:ext cx="681926" cy="461665"/>
+              </a:xfrm>
+              <a:prstGeom prst="rect">
+                <a:avLst/>
+              </a:prstGeom>
+              <a:blipFill>
+                <a:blip r:embed="rId5"/>
+                <a:stretch>
+                  <a:fillRect/>
+                </a:stretch>
+              </a:blipFill>
+            </p:spPr>
+            <p:txBody>
+              <a:bodyPr/>
+              <a:lstStyle/>
+              <a:p>
+                <a:r>
+                  <a:rPr lang="en-US">
+                    <a:noFill/>
+                  </a:rPr>
+                  <a:t> </a:t>
+                </a:r>
+              </a:p>
+            </p:txBody>
+          </p:sp>
+        </mc:Fallback>
+      </mc:AlternateContent>
+      <mc:AlternateContent xmlns:mc="http://schemas.openxmlformats.org/markup-compatibility/2006">
+        <mc:Choice xmlns:a14="http://schemas.microsoft.com/office/drawing/2010/main" Requires="a14">
+          <p:sp>
+            <p:nvSpPr>
+              <p:cNvPr id="34" name="TextBox 33">
+                <a:extLst>
+                  <a:ext uri="{FF2B5EF4-FFF2-40B4-BE49-F238E27FC236}">
+                    <a16:creationId xmlns:a16="http://schemas.microsoft.com/office/drawing/2014/main" id="{A593706E-E05F-44D7-8119-1E7CB8BCA80C}"/>
+                  </a:ext>
+                </a:extLst>
+              </p:cNvPr>
+              <p:cNvSpPr txBox="1"/>
+              <p:nvPr/>
+            </p:nvSpPr>
+            <p:spPr>
+              <a:xfrm>
+                <a:off x="222864" y="2772236"/>
+                <a:ext cx="681926" cy="461665"/>
+              </a:xfrm>
+              <a:prstGeom prst="rect">
+                <a:avLst/>
+              </a:prstGeom>
+              <a:noFill/>
+            </p:spPr>
+            <p:txBody>
+              <a:bodyPr wrap="square" rtlCol="0">
+                <a:spAutoFit/>
+              </a:bodyPr>
+              <a:lstStyle/>
+              <a:p>
+                <a:pPr/>
+                <a14:m>
+                  <m:oMathPara xmlns:m="http://schemas.openxmlformats.org/officeDocument/2006/math">
+                    <m:oMathParaPr>
+                      <m:jc m:val="centerGroup"/>
+                    </m:oMathParaPr>
+                    <m:oMath xmlns:m="http://schemas.openxmlformats.org/officeDocument/2006/math">
+                      <m:r>
+                        <a:rPr lang="en-US" sz="2400" b="0" i="1" smtClean="0">
+                          <a:latin typeface="Cambria Math" panose="02040503050406030204" pitchFamily="18" charset="0"/>
+                        </a:rPr>
+                        <m:t>𝑈</m:t>
+                      </m:r>
+                    </m:oMath>
+                  </m:oMathPara>
+                </a14:m>
+                <a:endParaRPr lang="en-US" sz="2400" dirty="0"/>
+              </a:p>
+            </p:txBody>
+          </p:sp>
+        </mc:Choice>
+        <mc:Fallback>
+          <p:sp>
+            <p:nvSpPr>
+              <p:cNvPr id="34" name="TextBox 33">
+                <a:extLst>
+                  <a:ext uri="{FF2B5EF4-FFF2-40B4-BE49-F238E27FC236}">
+                    <a16:creationId xmlns:a16="http://schemas.microsoft.com/office/drawing/2014/main" id="{A593706E-E05F-44D7-8119-1E7CB8BCA80C}"/>
+                  </a:ext>
+                </a:extLst>
+              </p:cNvPr>
+              <p:cNvSpPr txBox="1">
+                <a:spLocks noRot="1" noChangeAspect="1" noMove="1" noResize="1" noEditPoints="1" noAdjustHandles="1" noChangeArrowheads="1" noChangeShapeType="1" noTextEdit="1"/>
+              </p:cNvSpPr>
+              <p:nvPr/>
+            </p:nvSpPr>
+            <p:spPr>
+              <a:xfrm>
+                <a:off x="222864" y="2772236"/>
+                <a:ext cx="681926" cy="461665"/>
+              </a:xfrm>
+              <a:prstGeom prst="rect">
+                <a:avLst/>
+              </a:prstGeom>
+              <a:blipFill>
+                <a:blip r:embed="rId6"/>
+                <a:stretch>
+                  <a:fillRect/>
+                </a:stretch>
+              </a:blipFill>
+            </p:spPr>
+            <p:txBody>
+              <a:bodyPr/>
+              <a:lstStyle/>
+              <a:p>
+                <a:r>
+                  <a:rPr lang="en-US">
+                    <a:noFill/>
+                  </a:rPr>
+                  <a:t> </a:t>
+                </a:r>
+              </a:p>
+            </p:txBody>
+          </p:sp>
+        </mc:Fallback>
+      </mc:AlternateContent>
+      <mc:AlternateContent xmlns:mc="http://schemas.openxmlformats.org/markup-compatibility/2006">
+        <mc:Choice xmlns:a14="http://schemas.microsoft.com/office/drawing/2010/main" Requires="a14">
+          <p:sp>
+            <p:nvSpPr>
+              <p:cNvPr id="35" name="TextBox 34">
+                <a:extLst>
+                  <a:ext uri="{FF2B5EF4-FFF2-40B4-BE49-F238E27FC236}">
+                    <a16:creationId xmlns:a16="http://schemas.microsoft.com/office/drawing/2014/main" id="{613B4208-57B9-4747-9D7E-584297D6F7E7}"/>
+                  </a:ext>
+                </a:extLst>
+              </p:cNvPr>
+              <p:cNvSpPr txBox="1"/>
+              <p:nvPr/>
+            </p:nvSpPr>
+            <p:spPr>
+              <a:xfrm>
+                <a:off x="1934097" y="4490372"/>
+                <a:ext cx="681926" cy="461665"/>
+              </a:xfrm>
+              <a:prstGeom prst="rect">
+                <a:avLst/>
+              </a:prstGeom>
+              <a:noFill/>
+            </p:spPr>
+            <p:txBody>
+              <a:bodyPr wrap="square" rtlCol="0">
+                <a:spAutoFit/>
+              </a:bodyPr>
+              <a:lstStyle/>
+              <a:p>
+                <a:pPr/>
+                <a14:m>
+                  <m:oMathPara xmlns:m="http://schemas.openxmlformats.org/officeDocument/2006/math">
+                    <m:oMathParaPr>
+                      <m:jc m:val="centerGroup"/>
+                    </m:oMathParaPr>
+                    <m:oMath xmlns:m="http://schemas.openxmlformats.org/officeDocument/2006/math">
+                      <m:r>
+                        <a:rPr lang="en-US" sz="2400" b="0" i="1" smtClean="0">
+                          <a:latin typeface="Cambria Math" panose="02040503050406030204" pitchFamily="18" charset="0"/>
+                        </a:rPr>
+                        <m:t>𝐻</m:t>
+                      </m:r>
+                    </m:oMath>
+                  </m:oMathPara>
+                </a14:m>
+                <a:endParaRPr lang="en-US" sz="2400" dirty="0"/>
+              </a:p>
+            </p:txBody>
+          </p:sp>
+        </mc:Choice>
+        <mc:Fallback>
+          <p:sp>
+            <p:nvSpPr>
+              <p:cNvPr id="35" name="TextBox 34">
+                <a:extLst>
+                  <a:ext uri="{FF2B5EF4-FFF2-40B4-BE49-F238E27FC236}">
+                    <a16:creationId xmlns:a16="http://schemas.microsoft.com/office/drawing/2014/main" id="{613B4208-57B9-4747-9D7E-584297D6F7E7}"/>
+                  </a:ext>
+                </a:extLst>
+              </p:cNvPr>
+              <p:cNvSpPr txBox="1">
+                <a:spLocks noRot="1" noChangeAspect="1" noMove="1" noResize="1" noEditPoints="1" noAdjustHandles="1" noChangeArrowheads="1" noChangeShapeType="1" noTextEdit="1"/>
+              </p:cNvSpPr>
+              <p:nvPr/>
+            </p:nvSpPr>
+            <p:spPr>
+              <a:xfrm>
+                <a:off x="1934097" y="4490372"/>
+                <a:ext cx="681926" cy="461665"/>
+              </a:xfrm>
+              <a:prstGeom prst="rect">
+                <a:avLst/>
+              </a:prstGeom>
+              <a:blipFill>
+                <a:blip r:embed="rId7"/>
+                <a:stretch>
+                  <a:fillRect/>
+                </a:stretch>
+              </a:blipFill>
+            </p:spPr>
+            <p:txBody>
+              <a:bodyPr/>
+              <a:lstStyle/>
+              <a:p>
+                <a:r>
+                  <a:rPr lang="en-US">
+                    <a:noFill/>
+                  </a:rPr>
+                  <a:t> </a:t>
+                </a:r>
+              </a:p>
+            </p:txBody>
+          </p:sp>
+        </mc:Fallback>
+      </mc:AlternateContent>
+      <mc:AlternateContent xmlns:mc="http://schemas.openxmlformats.org/markup-compatibility/2006">
+        <mc:Choice xmlns:a14="http://schemas.microsoft.com/office/drawing/2010/main" Requires="a14">
+          <p:sp>
+            <p:nvSpPr>
+              <p:cNvPr id="36" name="TextBox 35">
+                <a:extLst>
+                  <a:ext uri="{FF2B5EF4-FFF2-40B4-BE49-F238E27FC236}">
+                    <a16:creationId xmlns:a16="http://schemas.microsoft.com/office/drawing/2014/main" id="{7879D7A9-9A00-41A3-9D06-8A8DB5F17F8A}"/>
+                  </a:ext>
+                </a:extLst>
+              </p:cNvPr>
+              <p:cNvSpPr txBox="1"/>
+              <p:nvPr/>
+            </p:nvSpPr>
+            <p:spPr>
+              <a:xfrm>
+                <a:off x="3637710" y="4490372"/>
+                <a:ext cx="681926" cy="461665"/>
+              </a:xfrm>
+              <a:prstGeom prst="rect">
+                <a:avLst/>
+              </a:prstGeom>
+              <a:noFill/>
+            </p:spPr>
+            <p:txBody>
+              <a:bodyPr wrap="square" rtlCol="0">
+                <a:spAutoFit/>
+              </a:bodyPr>
+              <a:lstStyle/>
+              <a:p>
+                <a:pPr/>
+                <a14:m>
+                  <m:oMathPara xmlns:m="http://schemas.openxmlformats.org/officeDocument/2006/math">
+                    <m:oMathParaPr>
+                      <m:jc m:val="centerGroup"/>
+                    </m:oMathParaPr>
+                    <m:oMath xmlns:m="http://schemas.openxmlformats.org/officeDocument/2006/math">
+                      <m:r>
+                        <a:rPr lang="en-US" sz="2400" b="0" i="1" smtClean="0">
+                          <a:latin typeface="Cambria Math" panose="02040503050406030204" pitchFamily="18" charset="0"/>
+                        </a:rPr>
+                        <m:t>𝑃</m:t>
+                      </m:r>
+                    </m:oMath>
+                  </m:oMathPara>
+                </a14:m>
+                <a:endParaRPr lang="en-US" sz="2400" dirty="0"/>
+              </a:p>
+            </p:txBody>
+          </p:sp>
+        </mc:Choice>
+        <mc:Fallback>
+          <p:sp>
+            <p:nvSpPr>
+              <p:cNvPr id="36" name="TextBox 35">
+                <a:extLst>
+                  <a:ext uri="{FF2B5EF4-FFF2-40B4-BE49-F238E27FC236}">
+                    <a16:creationId xmlns:a16="http://schemas.microsoft.com/office/drawing/2014/main" id="{7879D7A9-9A00-41A3-9D06-8A8DB5F17F8A}"/>
+                  </a:ext>
+                </a:extLst>
+              </p:cNvPr>
+              <p:cNvSpPr txBox="1">
+                <a:spLocks noRot="1" noChangeAspect="1" noMove="1" noResize="1" noEditPoints="1" noAdjustHandles="1" noChangeArrowheads="1" noChangeShapeType="1" noTextEdit="1"/>
+              </p:cNvSpPr>
+              <p:nvPr/>
+            </p:nvSpPr>
+            <p:spPr>
+              <a:xfrm>
+                <a:off x="3637710" y="4490372"/>
+                <a:ext cx="681926" cy="461665"/>
+              </a:xfrm>
+              <a:prstGeom prst="rect">
+                <a:avLst/>
+              </a:prstGeom>
+              <a:blipFill>
+                <a:blip r:embed="rId8"/>
+                <a:stretch>
+                  <a:fillRect/>
+                </a:stretch>
+              </a:blipFill>
+            </p:spPr>
+            <p:txBody>
+              <a:bodyPr/>
+              <a:lstStyle/>
+              <a:p>
+                <a:r>
+                  <a:rPr lang="en-US">
+                    <a:noFill/>
+                  </a:rPr>
+                  <a:t> </a:t>
+                </a:r>
+              </a:p>
+            </p:txBody>
+          </p:sp>
+        </mc:Fallback>
+      </mc:AlternateContent>
+      <mc:AlternateContent xmlns:mc="http://schemas.openxmlformats.org/markup-compatibility/2006">
+        <mc:Choice xmlns:a14="http://schemas.microsoft.com/office/drawing/2010/main" Requires="a14">
+          <p:sp>
+            <p:nvSpPr>
+              <p:cNvPr id="37" name="TextBox 36">
+                <a:extLst>
+                  <a:ext uri="{FF2B5EF4-FFF2-40B4-BE49-F238E27FC236}">
+                    <a16:creationId xmlns:a16="http://schemas.microsoft.com/office/drawing/2014/main" id="{B359F595-6591-4E26-8CBC-5234710C8806}"/>
+                  </a:ext>
+                </a:extLst>
+              </p:cNvPr>
+              <p:cNvSpPr txBox="1"/>
+              <p:nvPr/>
+            </p:nvSpPr>
+            <p:spPr>
+              <a:xfrm>
+                <a:off x="222864" y="4490372"/>
+                <a:ext cx="681926" cy="461665"/>
+              </a:xfrm>
+              <a:prstGeom prst="rect">
+                <a:avLst/>
+              </a:prstGeom>
+              <a:noFill/>
+            </p:spPr>
+            <p:txBody>
+              <a:bodyPr wrap="square" rtlCol="0">
+                <a:spAutoFit/>
+              </a:bodyPr>
+              <a:lstStyle/>
+              <a:p>
+                <a:pPr/>
+                <a14:m>
+                  <m:oMathPara xmlns:m="http://schemas.openxmlformats.org/officeDocument/2006/math">
+                    <m:oMathParaPr>
+                      <m:jc m:val="centerGroup"/>
+                    </m:oMathParaPr>
+                    <m:oMath xmlns:m="http://schemas.openxmlformats.org/officeDocument/2006/math">
+                      <m:r>
+                        <a:rPr lang="en-US" sz="2400" b="0" i="1" smtClean="0">
+                          <a:latin typeface="Cambria Math" panose="02040503050406030204" pitchFamily="18" charset="0"/>
+                        </a:rPr>
+                        <m:t>𝑆</m:t>
+                      </m:r>
+                    </m:oMath>
+                  </m:oMathPara>
+                </a14:m>
+                <a:endParaRPr lang="en-US" sz="2400" dirty="0"/>
+              </a:p>
+            </p:txBody>
+          </p:sp>
+        </mc:Choice>
+        <mc:Fallback>
+          <p:sp>
+            <p:nvSpPr>
+              <p:cNvPr id="37" name="TextBox 36">
+                <a:extLst>
+                  <a:ext uri="{FF2B5EF4-FFF2-40B4-BE49-F238E27FC236}">
+                    <a16:creationId xmlns:a16="http://schemas.microsoft.com/office/drawing/2014/main" id="{B359F595-6591-4E26-8CBC-5234710C8806}"/>
+                  </a:ext>
+                </a:extLst>
+              </p:cNvPr>
+              <p:cNvSpPr txBox="1">
+                <a:spLocks noRot="1" noChangeAspect="1" noMove="1" noResize="1" noEditPoints="1" noAdjustHandles="1" noChangeArrowheads="1" noChangeShapeType="1" noTextEdit="1"/>
+              </p:cNvSpPr>
+              <p:nvPr/>
+            </p:nvSpPr>
+            <p:spPr>
+              <a:xfrm>
+                <a:off x="222864" y="4490372"/>
+                <a:ext cx="681926" cy="461665"/>
+              </a:xfrm>
+              <a:prstGeom prst="rect">
+                <a:avLst/>
+              </a:prstGeom>
+              <a:blipFill>
+                <a:blip r:embed="rId9"/>
+                <a:stretch>
+                  <a:fillRect/>
+                </a:stretch>
+              </a:blipFill>
+            </p:spPr>
+            <p:txBody>
+              <a:bodyPr/>
+              <a:lstStyle/>
+              <a:p>
+                <a:r>
+                  <a:rPr lang="en-US">
+                    <a:noFill/>
+                  </a:rPr>
+                  <a:t> </a:t>
+                </a:r>
+              </a:p>
+            </p:txBody>
+          </p:sp>
+        </mc:Fallback>
+      </mc:AlternateContent>
+      <p:cxnSp>
+        <p:nvCxnSpPr>
+          <p:cNvPr id="48" name="Straight Arrow Connector 47">
+            <a:extLst>
+              <a:ext uri="{FF2B5EF4-FFF2-40B4-BE49-F238E27FC236}">
+                <a16:creationId xmlns:a16="http://schemas.microsoft.com/office/drawing/2014/main" id="{DB4FFA5D-159F-4210-ABE1-D26E8A8F9203}"/>
+              </a:ext>
+            </a:extLst>
+          </p:cNvPr>
+          <p:cNvCxnSpPr>
+            <a:cxnSpLocks/>
+          </p:cNvCxnSpPr>
+          <p:nvPr/>
+        </p:nvCxnSpPr>
+        <p:spPr>
+          <a:xfrm flipV="1">
+            <a:off x="930144" y="1675785"/>
+            <a:ext cx="2682212" cy="2671616"/>
+          </a:xfrm>
+          <a:prstGeom prst="straightConnector1">
+            <a:avLst/>
+          </a:prstGeom>
+          <a:ln w="25400">
+            <a:tailEnd type="stealth" w="lg" len="lg"/>
+          </a:ln>
+        </p:spPr>
+        <p:style>
+          <a:lnRef idx="1">
+            <a:schemeClr val="dk1"/>
+          </a:lnRef>
+          <a:fillRef idx="0">
+            <a:schemeClr val="dk1"/>
+          </a:fillRef>
+          <a:effectRef idx="0">
+            <a:schemeClr val="dk1"/>
+          </a:effectRef>
+          <a:fontRef idx="minor">
+            <a:schemeClr val="tx1"/>
+          </a:fontRef>
+        </p:style>
+      </p:cxnSp>
+      <p:cxnSp>
+        <p:nvCxnSpPr>
+          <p:cNvPr id="50" name="Straight Arrow Connector 49">
+            <a:extLst>
+              <a:ext uri="{FF2B5EF4-FFF2-40B4-BE49-F238E27FC236}">
+                <a16:creationId xmlns:a16="http://schemas.microsoft.com/office/drawing/2014/main" id="{17FF29D5-C10A-4396-8482-D801B1EF8CE3}"/>
+              </a:ext>
+            </a:extLst>
+          </p:cNvPr>
+          <p:cNvCxnSpPr>
+            <a:cxnSpLocks/>
+          </p:cNvCxnSpPr>
+          <p:nvPr/>
+        </p:nvCxnSpPr>
+        <p:spPr>
+          <a:xfrm flipH="1" flipV="1">
+            <a:off x="958144" y="1675785"/>
+            <a:ext cx="2654212" cy="2671615"/>
+          </a:xfrm>
+          <a:prstGeom prst="straightConnector1">
+            <a:avLst/>
+          </a:prstGeom>
+          <a:ln w="25400">
+            <a:tailEnd type="stealth" w="lg" len="lg"/>
+          </a:ln>
+        </p:spPr>
+        <p:style>
+          <a:lnRef idx="1">
+            <a:schemeClr val="dk1"/>
+          </a:lnRef>
+          <a:fillRef idx="0">
+            <a:schemeClr val="dk1"/>
+          </a:fillRef>
+          <a:effectRef idx="0">
+            <a:schemeClr val="dk1"/>
+          </a:effectRef>
+          <a:fontRef idx="minor">
+            <a:schemeClr val="tx1"/>
+          </a:fontRef>
+        </p:style>
+      </p:cxnSp>
+      <mc:AlternateContent xmlns:mc="http://schemas.openxmlformats.org/markup-compatibility/2006">
+        <mc:Choice xmlns:a14="http://schemas.microsoft.com/office/drawing/2010/main" Requires="a14">
+          <p:sp>
+            <p:nvSpPr>
+              <p:cNvPr id="15" name="TextBox 14">
+                <a:extLst>
+                  <a:ext uri="{FF2B5EF4-FFF2-40B4-BE49-F238E27FC236}">
+                    <a16:creationId xmlns:a16="http://schemas.microsoft.com/office/drawing/2014/main" id="{9996BE16-EE2E-46BF-9374-6F9CFC1884E0}"/>
+                  </a:ext>
+                </a:extLst>
+              </p:cNvPr>
+              <p:cNvSpPr txBox="1"/>
+              <p:nvPr/>
+            </p:nvSpPr>
+            <p:spPr>
+              <a:xfrm>
+                <a:off x="1930287" y="5012337"/>
+                <a:ext cx="5914760" cy="790281"/>
+              </a:xfrm>
+              <a:prstGeom prst="rect">
+                <a:avLst/>
+              </a:prstGeom>
+              <a:noFill/>
+            </p:spPr>
+            <p:txBody>
+              <a:bodyPr wrap="none" rtlCol="0">
+                <a:spAutoFit/>
+              </a:bodyPr>
+              <a:lstStyle/>
+              <a:p>
+                <a:pPr/>
+                <a14:m>
+                  <m:oMathPara xmlns:m="http://schemas.openxmlformats.org/officeDocument/2006/math">
+                    <m:oMathParaPr>
+                      <m:jc m:val="centerGroup"/>
+                    </m:oMathParaPr>
+                    <m:oMath xmlns:m="http://schemas.openxmlformats.org/officeDocument/2006/math">
+                      <m:sSub>
+                        <m:sSubPr>
+                          <m:ctrlPr>
+                            <a:rPr lang="en-US" b="0" i="1" smtClean="0">
+                              <a:latin typeface="Cambria Math" panose="02040503050406030204" pitchFamily="18" charset="0"/>
+                            </a:rPr>
+                          </m:ctrlPr>
+                        </m:sSubPr>
+                        <m:e>
+                          <m:sSub>
+                            <m:sSubPr>
+                              <m:ctrlPr>
+                                <a:rPr lang="en-US" i="1">
+                                  <a:latin typeface="Cambria Math" panose="02040503050406030204" pitchFamily="18" charset="0"/>
+                                </a:rPr>
+                              </m:ctrlPr>
+                            </m:sSubPr>
+                            <m:e>
+                              <m:d>
+                                <m:dPr>
+                                  <m:ctrlPr>
+                                    <a:rPr lang="en-US" i="1">
+                                      <a:latin typeface="Cambria Math" panose="02040503050406030204" pitchFamily="18" charset="0"/>
+                                    </a:rPr>
+                                  </m:ctrlPr>
+                                </m:dPr>
+                                <m:e>
+                                  <m:f>
+                                    <m:fPr>
+                                      <m:ctrlPr>
+                                        <a:rPr lang="en-US" i="1">
+                                          <a:latin typeface="Cambria Math" panose="02040503050406030204" pitchFamily="18" charset="0"/>
+                                        </a:rPr>
+                                      </m:ctrlPr>
+                                    </m:fPr>
+                                    <m:num>
+                                      <m:r>
+                                        <a:rPr lang="en-US" i="1">
+                                          <a:latin typeface="Cambria Math" panose="02040503050406030204" pitchFamily="18" charset="0"/>
+                                        </a:rPr>
+                                        <m:t>𝜕</m:t>
+                                      </m:r>
+                                      <m:r>
+                                        <a:rPr lang="en-US" i="1">
+                                          <a:latin typeface="Cambria Math" panose="02040503050406030204" pitchFamily="18" charset="0"/>
+                                        </a:rPr>
+                                        <m:t>𝑇</m:t>
+                                      </m:r>
+                                    </m:num>
+                                    <m:den>
+                                      <m:r>
+                                        <a:rPr lang="en-US" i="1">
+                                          <a:latin typeface="Cambria Math" panose="02040503050406030204" pitchFamily="18" charset="0"/>
+                                        </a:rPr>
+                                        <m:t>𝜕</m:t>
+                                      </m:r>
+                                      <m:r>
+                                        <a:rPr lang="en-US" i="1">
+                                          <a:latin typeface="Cambria Math" panose="02040503050406030204" pitchFamily="18" charset="0"/>
+                                        </a:rPr>
+                                        <m:t>𝑉</m:t>
+                                      </m:r>
+                                    </m:den>
+                                  </m:f>
+                                </m:e>
+                              </m:d>
+                            </m:e>
+                            <m:sub>
+                              <m:r>
+                                <a:rPr lang="en-US" i="1">
+                                  <a:latin typeface="Cambria Math" panose="02040503050406030204" pitchFamily="18" charset="0"/>
+                                </a:rPr>
+                                <m:t>𝑆</m:t>
+                              </m:r>
+                            </m:sub>
+                          </m:sSub>
+                          <m:r>
+                            <a:rPr lang="en-US" b="0" i="1" smtClean="0">
+                              <a:latin typeface="Cambria Math" panose="02040503050406030204" pitchFamily="18" charset="0"/>
+                            </a:rPr>
+                            <m:t>                                      =                                      </m:t>
+                          </m:r>
+                          <m:r>
+                            <a:rPr lang="en-US" b="0" i="1" smtClean="0">
+                              <a:latin typeface="Cambria Math" panose="02040503050406030204" pitchFamily="18" charset="0"/>
+                            </a:rPr>
+                            <m:t>−</m:t>
+                          </m:r>
+                          <m:d>
+                            <m:dPr>
+                              <m:ctrlPr>
+                                <a:rPr lang="en-US" b="0" i="1" smtClean="0">
+                                  <a:latin typeface="Cambria Math" panose="02040503050406030204" pitchFamily="18" charset="0"/>
+                                </a:rPr>
+                              </m:ctrlPr>
+                            </m:dPr>
+                            <m:e>
+                              <m:f>
+                                <m:fPr>
+                                  <m:ctrlPr>
+                                    <a:rPr lang="en-US" b="0" i="1" smtClean="0">
+                                      <a:latin typeface="Cambria Math" panose="02040503050406030204" pitchFamily="18" charset="0"/>
+                                    </a:rPr>
+                                  </m:ctrlPr>
+                                </m:fPr>
+                                <m:num>
+                                  <m:r>
+                                    <a:rPr lang="en-US" b="0" i="1" smtClean="0">
+                                      <a:latin typeface="Cambria Math" panose="02040503050406030204" pitchFamily="18" charset="0"/>
+                                    </a:rPr>
+                                    <m:t>𝜕</m:t>
+                                  </m:r>
+                                  <m:r>
+                                    <a:rPr lang="en-US" b="0" i="1" smtClean="0">
+                                      <a:latin typeface="Cambria Math" panose="02040503050406030204" pitchFamily="18" charset="0"/>
+                                    </a:rPr>
+                                    <m:t>𝑃</m:t>
+                                  </m:r>
+                                </m:num>
+                                <m:den>
+                                  <m:r>
+                                    <a:rPr lang="en-US" b="0" i="1" smtClean="0">
+                                      <a:latin typeface="Cambria Math" panose="02040503050406030204" pitchFamily="18" charset="0"/>
+                                    </a:rPr>
+                                    <m:t>𝜕</m:t>
+                                  </m:r>
+                                  <m:r>
+                                    <a:rPr lang="en-US" b="0" i="1" smtClean="0">
+                                      <a:latin typeface="Cambria Math" panose="02040503050406030204" pitchFamily="18" charset="0"/>
+                                    </a:rPr>
+                                    <m:t>𝑆</m:t>
+                                  </m:r>
+                                </m:den>
+                              </m:f>
+                            </m:e>
+                          </m:d>
+                        </m:e>
+                        <m:sub>
+                          <m:r>
+                            <a:rPr lang="en-US" b="0" i="1" smtClean="0">
+                              <a:latin typeface="Cambria Math" panose="02040503050406030204" pitchFamily="18" charset="0"/>
+                            </a:rPr>
+                            <m:t>𝑉</m:t>
+                          </m:r>
+                        </m:sub>
+                      </m:sSub>
+                    </m:oMath>
+                  </m:oMathPara>
+                </a14:m>
+                <a:endParaRPr lang="en-US" dirty="0"/>
+              </a:p>
+            </p:txBody>
+          </p:sp>
+        </mc:Choice>
+        <mc:Fallback>
+          <p:sp>
+            <p:nvSpPr>
+              <p:cNvPr id="15" name="TextBox 14">
+                <a:extLst>
+                  <a:ext uri="{FF2B5EF4-FFF2-40B4-BE49-F238E27FC236}">
+                    <a16:creationId xmlns:a16="http://schemas.microsoft.com/office/drawing/2014/main" id="{9996BE16-EE2E-46BF-9374-6F9CFC1884E0}"/>
+                  </a:ext>
+                </a:extLst>
+              </p:cNvPr>
+              <p:cNvSpPr txBox="1">
+                <a:spLocks noRot="1" noChangeAspect="1" noMove="1" noResize="1" noEditPoints="1" noAdjustHandles="1" noChangeArrowheads="1" noChangeShapeType="1" noTextEdit="1"/>
+              </p:cNvSpPr>
+              <p:nvPr/>
+            </p:nvSpPr>
+            <p:spPr>
+              <a:xfrm>
+                <a:off x="1930287" y="5012337"/>
+                <a:ext cx="5914760" cy="790281"/>
+              </a:xfrm>
+              <a:prstGeom prst="rect">
+                <a:avLst/>
+              </a:prstGeom>
+              <a:blipFill>
+                <a:blip r:embed="rId10"/>
+                <a:stretch>
+                  <a:fillRect/>
+                </a:stretch>
+              </a:blipFill>
+            </p:spPr>
+            <p:txBody>
+              <a:bodyPr/>
+              <a:lstStyle/>
+              <a:p>
+                <a:r>
+                  <a:rPr lang="en-US">
+                    <a:noFill/>
+                  </a:rPr>
+                  <a:t> </a:t>
+                </a:r>
+              </a:p>
+            </p:txBody>
+          </p:sp>
+        </mc:Fallback>
+      </mc:AlternateContent>
+      <p:sp>
+        <p:nvSpPr>
+          <p:cNvPr id="39" name="Freeform: Shape 38">
+            <a:extLst>
+              <a:ext uri="{FF2B5EF4-FFF2-40B4-BE49-F238E27FC236}">
+                <a16:creationId xmlns:a16="http://schemas.microsoft.com/office/drawing/2014/main" id="{8EFD1510-2E7C-4CBC-99BC-EF714648CED5}"/>
+              </a:ext>
+            </a:extLst>
+          </p:cNvPr>
+          <p:cNvSpPr/>
+          <p:nvPr/>
+        </p:nvSpPr>
+        <p:spPr>
+          <a:xfrm rot="16200000">
+            <a:off x="5508963" y="1122332"/>
+            <a:ext cx="3769112" cy="3769112"/>
+          </a:xfrm>
+          <a:custGeom>
+            <a:avLst/>
+            <a:gdLst>
+              <a:gd name="connsiteX0" fmla="*/ 0 w 3769112"/>
+              <a:gd name="connsiteY0" fmla="*/ 3715771 h 3769112"/>
+              <a:gd name="connsiteX1" fmla="*/ 0 w 3769112"/>
+              <a:gd name="connsiteY1" fmla="*/ 266699 h 3769112"/>
+              <a:gd name="connsiteX2" fmla="*/ 0 w 3769112"/>
+              <a:gd name="connsiteY2" fmla="*/ 53341 h 3769112"/>
+              <a:gd name="connsiteX3" fmla="*/ 53341 w 3769112"/>
+              <a:gd name="connsiteY3" fmla="*/ 0 h 3769112"/>
+              <a:gd name="connsiteX4" fmla="*/ 266699 w 3769112"/>
+              <a:gd name="connsiteY4" fmla="*/ 0 h 3769112"/>
+              <a:gd name="connsiteX5" fmla="*/ 3715771 w 3769112"/>
+              <a:gd name="connsiteY5" fmla="*/ 0 h 3769112"/>
+              <a:gd name="connsiteX6" fmla="*/ 3769112 w 3769112"/>
+              <a:gd name="connsiteY6" fmla="*/ 53341 h 3769112"/>
+              <a:gd name="connsiteX7" fmla="*/ 3769112 w 3769112"/>
+              <a:gd name="connsiteY7" fmla="*/ 266699 h 3769112"/>
+              <a:gd name="connsiteX8" fmla="*/ 3715771 w 3769112"/>
+              <a:gd name="connsiteY8" fmla="*/ 320040 h 3769112"/>
+              <a:gd name="connsiteX9" fmla="*/ 320040 w 3769112"/>
+              <a:gd name="connsiteY9" fmla="*/ 320040 h 3769112"/>
+              <a:gd name="connsiteX10" fmla="*/ 320040 w 3769112"/>
+              <a:gd name="connsiteY10" fmla="*/ 3715771 h 3769112"/>
+              <a:gd name="connsiteX11" fmla="*/ 266699 w 3769112"/>
+              <a:gd name="connsiteY11" fmla="*/ 3769112 h 3769112"/>
+              <a:gd name="connsiteX12" fmla="*/ 53341 w 3769112"/>
+              <a:gd name="connsiteY12" fmla="*/ 3769112 h 3769112"/>
+              <a:gd name="connsiteX13" fmla="*/ 0 w 3769112"/>
+              <a:gd name="connsiteY13" fmla="*/ 3715771 h 3769112"/>
+            </a:gdLst>
+            <a:ahLst/>
+            <a:cxnLst>
+              <a:cxn ang="0">
+                <a:pos x="connsiteX0" y="connsiteY0"/>
+              </a:cxn>
+              <a:cxn ang="0">
+                <a:pos x="connsiteX1" y="connsiteY1"/>
+              </a:cxn>
+              <a:cxn ang="0">
+                <a:pos x="connsiteX2" y="connsiteY2"/>
+              </a:cxn>
+              <a:cxn ang="0">
+                <a:pos x="connsiteX3" y="connsiteY3"/>
+              </a:cxn>
+              <a:cxn ang="0">
+                <a:pos x="connsiteX4" y="connsiteY4"/>
+              </a:cxn>
+              <a:cxn ang="0">
+                <a:pos x="connsiteX5" y="connsiteY5"/>
+              </a:cxn>
+              <a:cxn ang="0">
+                <a:pos x="connsiteX6" y="connsiteY6"/>
+              </a:cxn>
+              <a:cxn ang="0">
+                <a:pos x="connsiteX7" y="connsiteY7"/>
+              </a:cxn>
+              <a:cxn ang="0">
+                <a:pos x="connsiteX8" y="connsiteY8"/>
+              </a:cxn>
+              <a:cxn ang="0">
+                <a:pos x="connsiteX9" y="connsiteY9"/>
+              </a:cxn>
+              <a:cxn ang="0">
+                <a:pos x="connsiteX10" y="connsiteY10"/>
+              </a:cxn>
+              <a:cxn ang="0">
+                <a:pos x="connsiteX11" y="connsiteY11"/>
+              </a:cxn>
+              <a:cxn ang="0">
+                <a:pos x="connsiteX12" y="connsiteY12"/>
+              </a:cxn>
+              <a:cxn ang="0">
+                <a:pos x="connsiteX13" y="connsiteY13"/>
+              </a:cxn>
+            </a:cxnLst>
+            <a:rect l="l" t="t" r="r" b="b"/>
+            <a:pathLst>
+              <a:path w="3769112" h="3769112">
+                <a:moveTo>
+                  <a:pt x="0" y="3715771"/>
+                </a:moveTo>
+                <a:lnTo>
+                  <a:pt x="0" y="266699"/>
+                </a:lnTo>
+                <a:lnTo>
+                  <a:pt x="0" y="53341"/>
+                </a:lnTo>
+                <a:cubicBezTo>
+                  <a:pt x="0" y="23882"/>
+                  <a:pt x="23882" y="0"/>
+                  <a:pt x="53341" y="0"/>
+                </a:cubicBezTo>
+                <a:lnTo>
+                  <a:pt x="266699" y="0"/>
+                </a:lnTo>
+                <a:lnTo>
+                  <a:pt x="3715771" y="0"/>
+                </a:lnTo>
+                <a:cubicBezTo>
+                  <a:pt x="3745230" y="0"/>
+                  <a:pt x="3769112" y="23882"/>
+                  <a:pt x="3769112" y="53341"/>
+                </a:cubicBezTo>
+                <a:lnTo>
+                  <a:pt x="3769112" y="266699"/>
+                </a:lnTo>
+                <a:cubicBezTo>
+                  <a:pt x="3769112" y="296158"/>
+                  <a:pt x="3745230" y="320040"/>
+                  <a:pt x="3715771" y="320040"/>
+                </a:cubicBezTo>
+                <a:lnTo>
+                  <a:pt x="320040" y="320040"/>
+                </a:lnTo>
+                <a:lnTo>
+                  <a:pt x="320040" y="3715771"/>
+                </a:lnTo>
+                <a:cubicBezTo>
+                  <a:pt x="320040" y="3745230"/>
+                  <a:pt x="296158" y="3769112"/>
+                  <a:pt x="266699" y="3769112"/>
+                </a:cubicBezTo>
+                <a:lnTo>
+                  <a:pt x="53341" y="3769112"/>
+                </a:lnTo>
+                <a:cubicBezTo>
+                  <a:pt x="23882" y="3769112"/>
+                  <a:pt x="0" y="3745230"/>
+                  <a:pt x="0" y="3715771"/>
+                </a:cubicBezTo>
+                <a:close/>
+              </a:path>
+            </a:pathLst>
+          </a:custGeom>
+          <a:solidFill>
+            <a:srgbClr val="FFFF00">
+              <a:alpha val="40000"/>
+            </a:srgbClr>
+          </a:solidFill>
+          <a:ln>
+            <a:noFill/>
+          </a:ln>
+        </p:spPr>
+        <p:style>
+          <a:lnRef idx="2">
+            <a:schemeClr val="accent1">
+              <a:shade val="50000"/>
+            </a:schemeClr>
+          </a:lnRef>
+          <a:fillRef idx="1">
+            <a:schemeClr val="accent1"/>
+          </a:fillRef>
+          <a:effectRef idx="0">
+            <a:schemeClr val="accent1"/>
+          </a:effectRef>
+          <a:fontRef idx="minor">
+            <a:schemeClr val="lt1"/>
+          </a:fontRef>
+        </p:style>
+        <p:txBody>
+          <a:bodyPr wrap="square" rtlCol="0" anchor="ctr">
+            <a:noAutofit/>
+          </a:bodyPr>
+          <a:lstStyle/>
+          <a:p>
+            <a:pPr algn="ctr"/>
+            <a:endParaRPr lang="en-US"/>
+          </a:p>
+        </p:txBody>
+      </p:sp>
+      <p:sp>
+        <p:nvSpPr>
+          <p:cNvPr id="40" name="Rectangle 39">
+            <a:extLst>
+              <a:ext uri="{FF2B5EF4-FFF2-40B4-BE49-F238E27FC236}">
+                <a16:creationId xmlns:a16="http://schemas.microsoft.com/office/drawing/2014/main" id="{D7C9DAA9-4D53-459E-8752-ACAF57714EEC}"/>
+              </a:ext>
+            </a:extLst>
+          </p:cNvPr>
+          <p:cNvSpPr/>
+          <p:nvPr/>
+        </p:nvSpPr>
+        <p:spPr>
+          <a:xfrm>
+            <a:off x="5995249" y="1602392"/>
+            <a:ext cx="2796540" cy="2796540"/>
+          </a:xfrm>
+          <a:prstGeom prst="rect">
+            <a:avLst/>
+          </a:prstGeom>
+          <a:ln w="25400">
+            <a:solidFill>
+              <a:schemeClr val="tx1"/>
+            </a:solidFill>
+          </a:ln>
+        </p:spPr>
+        <p:style>
+          <a:lnRef idx="2">
+            <a:schemeClr val="accent6"/>
+          </a:lnRef>
+          <a:fillRef idx="1">
+            <a:schemeClr val="lt1"/>
+          </a:fillRef>
+          <a:effectRef idx="0">
+            <a:schemeClr val="accent6"/>
+          </a:effectRef>
+          <a:fontRef idx="minor">
+            <a:schemeClr val="dk1"/>
+          </a:fontRef>
+        </p:style>
+        <p:txBody>
+          <a:bodyPr rtlCol="0" anchor="ctr"/>
+          <a:lstStyle/>
+          <a:p>
+            <a:pPr algn="ctr"/>
+            <a:endParaRPr lang="en-US"/>
+          </a:p>
+        </p:txBody>
+      </p:sp>
+      <mc:AlternateContent xmlns:mc="http://schemas.openxmlformats.org/markup-compatibility/2006">
+        <mc:Choice xmlns:a14="http://schemas.microsoft.com/office/drawing/2010/main" Requires="a14">
+          <p:sp>
+            <p:nvSpPr>
+              <p:cNvPr id="41" name="TextBox 40">
+                <a:extLst>
+                  <a:ext uri="{FF2B5EF4-FFF2-40B4-BE49-F238E27FC236}">
+                    <a16:creationId xmlns:a16="http://schemas.microsoft.com/office/drawing/2014/main" id="{BA3DF175-0FC1-4162-A196-9BDA46BB950C}"/>
+                  </a:ext>
+                </a:extLst>
+              </p:cNvPr>
+              <p:cNvSpPr txBox="1"/>
+              <p:nvPr/>
+            </p:nvSpPr>
+            <p:spPr>
+              <a:xfrm>
+                <a:off x="7048746" y="1054100"/>
+                <a:ext cx="681926" cy="461665"/>
+              </a:xfrm>
+              <a:prstGeom prst="rect">
+                <a:avLst/>
+              </a:prstGeom>
+              <a:noFill/>
+            </p:spPr>
+            <p:txBody>
+              <a:bodyPr wrap="square" rtlCol="0">
+                <a:spAutoFit/>
+              </a:bodyPr>
+              <a:lstStyle/>
+              <a:p>
+                <a:pPr/>
+                <a14:m>
+                  <m:oMathPara xmlns:m="http://schemas.openxmlformats.org/officeDocument/2006/math">
+                    <m:oMathParaPr>
+                      <m:jc m:val="centerGroup"/>
+                    </m:oMathParaPr>
+                    <m:oMath xmlns:m="http://schemas.openxmlformats.org/officeDocument/2006/math">
+                      <m:r>
+                        <a:rPr lang="en-US" sz="2400" b="0" i="1" smtClean="0">
+                          <a:latin typeface="Cambria Math" panose="02040503050406030204" pitchFamily="18" charset="0"/>
+                        </a:rPr>
+                        <m:t>𝐹</m:t>
+                      </m:r>
+                    </m:oMath>
+                  </m:oMathPara>
+                </a14:m>
+                <a:endParaRPr lang="en-US" sz="2400" dirty="0"/>
+              </a:p>
+            </p:txBody>
+          </p:sp>
+        </mc:Choice>
+        <mc:Fallback>
+          <p:sp>
+            <p:nvSpPr>
+              <p:cNvPr id="41" name="TextBox 40">
+                <a:extLst>
+                  <a:ext uri="{FF2B5EF4-FFF2-40B4-BE49-F238E27FC236}">
+                    <a16:creationId xmlns:a16="http://schemas.microsoft.com/office/drawing/2014/main" id="{BA3DF175-0FC1-4162-A196-9BDA46BB950C}"/>
+                  </a:ext>
+                </a:extLst>
+              </p:cNvPr>
+              <p:cNvSpPr txBox="1">
+                <a:spLocks noRot="1" noChangeAspect="1" noMove="1" noResize="1" noEditPoints="1" noAdjustHandles="1" noChangeArrowheads="1" noChangeShapeType="1" noTextEdit="1"/>
+              </p:cNvSpPr>
+              <p:nvPr/>
+            </p:nvSpPr>
+            <p:spPr>
+              <a:xfrm>
+                <a:off x="7048746" y="1054100"/>
+                <a:ext cx="681926" cy="461665"/>
+              </a:xfrm>
+              <a:prstGeom prst="rect">
+                <a:avLst/>
+              </a:prstGeom>
+              <a:blipFill>
+                <a:blip r:embed="rId11"/>
+                <a:stretch>
+                  <a:fillRect/>
+                </a:stretch>
+              </a:blipFill>
+            </p:spPr>
+            <p:txBody>
+              <a:bodyPr/>
+              <a:lstStyle/>
+              <a:p>
+                <a:r>
+                  <a:rPr lang="en-US">
+                    <a:noFill/>
+                  </a:rPr>
+                  <a:t> </a:t>
+                </a:r>
+              </a:p>
+            </p:txBody>
+          </p:sp>
+        </mc:Fallback>
+      </mc:AlternateContent>
+      <mc:AlternateContent xmlns:mc="http://schemas.openxmlformats.org/markup-compatibility/2006">
+        <mc:Choice xmlns:a14="http://schemas.microsoft.com/office/drawing/2010/main" Requires="a14">
+          <p:sp>
+            <p:nvSpPr>
+              <p:cNvPr id="42" name="TextBox 41">
+                <a:extLst>
+                  <a:ext uri="{FF2B5EF4-FFF2-40B4-BE49-F238E27FC236}">
+                    <a16:creationId xmlns:a16="http://schemas.microsoft.com/office/drawing/2014/main" id="{BB002B08-635E-4B80-8BD4-1DEAE88FE5F1}"/>
+                  </a:ext>
+                </a:extLst>
+              </p:cNvPr>
+              <p:cNvSpPr txBox="1"/>
+              <p:nvPr/>
+            </p:nvSpPr>
+            <p:spPr>
+              <a:xfrm>
+                <a:off x="8756169" y="1054100"/>
+                <a:ext cx="681926" cy="461665"/>
+              </a:xfrm>
+              <a:prstGeom prst="rect">
+                <a:avLst/>
+              </a:prstGeom>
+              <a:noFill/>
+            </p:spPr>
+            <p:txBody>
+              <a:bodyPr wrap="square" rtlCol="0">
+                <a:spAutoFit/>
+              </a:bodyPr>
+              <a:lstStyle/>
+              <a:p>
+                <a:pPr/>
+                <a14:m>
+                  <m:oMathPara xmlns:m="http://schemas.openxmlformats.org/officeDocument/2006/math">
+                    <m:oMathParaPr>
+                      <m:jc m:val="centerGroup"/>
+                    </m:oMathParaPr>
+                    <m:oMath xmlns:m="http://schemas.openxmlformats.org/officeDocument/2006/math">
+                      <m:r>
+                        <a:rPr lang="en-US" sz="2400" b="0" i="1" smtClean="0">
+                          <a:latin typeface="Cambria Math" panose="02040503050406030204" pitchFamily="18" charset="0"/>
+                        </a:rPr>
+                        <m:t>𝑇</m:t>
+                      </m:r>
+                    </m:oMath>
+                  </m:oMathPara>
+                </a14:m>
+                <a:endParaRPr lang="en-US" sz="2400" dirty="0"/>
+              </a:p>
+            </p:txBody>
+          </p:sp>
+        </mc:Choice>
+        <mc:Fallback>
+          <p:sp>
+            <p:nvSpPr>
+              <p:cNvPr id="42" name="TextBox 41">
+                <a:extLst>
+                  <a:ext uri="{FF2B5EF4-FFF2-40B4-BE49-F238E27FC236}">
+                    <a16:creationId xmlns:a16="http://schemas.microsoft.com/office/drawing/2014/main" id="{BB002B08-635E-4B80-8BD4-1DEAE88FE5F1}"/>
+                  </a:ext>
+                </a:extLst>
+              </p:cNvPr>
+              <p:cNvSpPr txBox="1">
+                <a:spLocks noRot="1" noChangeAspect="1" noMove="1" noResize="1" noEditPoints="1" noAdjustHandles="1" noChangeArrowheads="1" noChangeShapeType="1" noTextEdit="1"/>
+              </p:cNvSpPr>
+              <p:nvPr/>
+            </p:nvSpPr>
+            <p:spPr>
+              <a:xfrm>
+                <a:off x="8756169" y="1054100"/>
+                <a:ext cx="681926" cy="461665"/>
+              </a:xfrm>
+              <a:prstGeom prst="rect">
+                <a:avLst/>
+              </a:prstGeom>
+              <a:blipFill>
+                <a:blip r:embed="rId12"/>
+                <a:stretch>
+                  <a:fillRect/>
+                </a:stretch>
+              </a:blipFill>
+            </p:spPr>
+            <p:txBody>
+              <a:bodyPr/>
+              <a:lstStyle/>
+              <a:p>
+                <a:r>
+                  <a:rPr lang="en-US">
+                    <a:noFill/>
+                  </a:rPr>
+                  <a:t> </a:t>
+                </a:r>
+              </a:p>
+            </p:txBody>
+          </p:sp>
+        </mc:Fallback>
+      </mc:AlternateContent>
+      <mc:AlternateContent xmlns:mc="http://schemas.openxmlformats.org/markup-compatibility/2006">
+        <mc:Choice xmlns:a14="http://schemas.microsoft.com/office/drawing/2010/main" Requires="a14">
+          <p:sp>
+            <p:nvSpPr>
+              <p:cNvPr id="43" name="TextBox 42">
+                <a:extLst>
+                  <a:ext uri="{FF2B5EF4-FFF2-40B4-BE49-F238E27FC236}">
+                    <a16:creationId xmlns:a16="http://schemas.microsoft.com/office/drawing/2014/main" id="{D1C5F85D-1237-443A-B25F-C074D42ABD1D}"/>
+                  </a:ext>
+                </a:extLst>
+              </p:cNvPr>
+              <p:cNvSpPr txBox="1"/>
+              <p:nvPr/>
+            </p:nvSpPr>
+            <p:spPr>
+              <a:xfrm>
+                <a:off x="5341323" y="1054100"/>
+                <a:ext cx="681926" cy="461665"/>
+              </a:xfrm>
+              <a:prstGeom prst="rect">
+                <a:avLst/>
+              </a:prstGeom>
+              <a:noFill/>
+            </p:spPr>
+            <p:txBody>
+              <a:bodyPr wrap="square" rtlCol="0">
+                <a:spAutoFit/>
+              </a:bodyPr>
+              <a:lstStyle/>
+              <a:p>
+                <a:pPr/>
+                <a14:m>
+                  <m:oMathPara xmlns:m="http://schemas.openxmlformats.org/officeDocument/2006/math">
+                    <m:oMathParaPr>
+                      <m:jc m:val="centerGroup"/>
+                    </m:oMathParaPr>
+                    <m:oMath xmlns:m="http://schemas.openxmlformats.org/officeDocument/2006/math">
+                      <m:r>
+                        <a:rPr lang="en-US" sz="2400" b="0" i="1" smtClean="0">
+                          <a:latin typeface="Cambria Math" panose="02040503050406030204" pitchFamily="18" charset="0"/>
+                        </a:rPr>
+                        <m:t>𝑉</m:t>
+                      </m:r>
+                    </m:oMath>
+                  </m:oMathPara>
+                </a14:m>
+                <a:endParaRPr lang="en-US" sz="2400" dirty="0"/>
+              </a:p>
+            </p:txBody>
+          </p:sp>
+        </mc:Choice>
+        <mc:Fallback>
+          <p:sp>
+            <p:nvSpPr>
+              <p:cNvPr id="43" name="TextBox 42">
+                <a:extLst>
+                  <a:ext uri="{FF2B5EF4-FFF2-40B4-BE49-F238E27FC236}">
+                    <a16:creationId xmlns:a16="http://schemas.microsoft.com/office/drawing/2014/main" id="{D1C5F85D-1237-443A-B25F-C074D42ABD1D}"/>
+                  </a:ext>
+                </a:extLst>
+              </p:cNvPr>
+              <p:cNvSpPr txBox="1">
+                <a:spLocks noRot="1" noChangeAspect="1" noMove="1" noResize="1" noEditPoints="1" noAdjustHandles="1" noChangeArrowheads="1" noChangeShapeType="1" noTextEdit="1"/>
+              </p:cNvSpPr>
+              <p:nvPr/>
+            </p:nvSpPr>
+            <p:spPr>
+              <a:xfrm>
+                <a:off x="5341323" y="1054100"/>
+                <a:ext cx="681926" cy="461665"/>
+              </a:xfrm>
+              <a:prstGeom prst="rect">
+                <a:avLst/>
+              </a:prstGeom>
+              <a:blipFill>
+                <a:blip r:embed="rId13"/>
+                <a:stretch>
+                  <a:fillRect/>
+                </a:stretch>
+              </a:blipFill>
+            </p:spPr>
+            <p:txBody>
+              <a:bodyPr/>
+              <a:lstStyle/>
+              <a:p>
+                <a:r>
+                  <a:rPr lang="en-US">
+                    <a:noFill/>
+                  </a:rPr>
+                  <a:t> </a:t>
+                </a:r>
+              </a:p>
+            </p:txBody>
+          </p:sp>
+        </mc:Fallback>
+      </mc:AlternateContent>
+      <mc:AlternateContent xmlns:mc="http://schemas.openxmlformats.org/markup-compatibility/2006">
+        <mc:Choice xmlns:a14="http://schemas.microsoft.com/office/drawing/2010/main" Requires="a14">
+          <p:sp>
+            <p:nvSpPr>
+              <p:cNvPr id="44" name="TextBox 43">
+                <a:extLst>
+                  <a:ext uri="{FF2B5EF4-FFF2-40B4-BE49-F238E27FC236}">
+                    <a16:creationId xmlns:a16="http://schemas.microsoft.com/office/drawing/2014/main" id="{413B120B-3E30-4319-9DDB-8D73C9D3CCBE}"/>
+                  </a:ext>
+                </a:extLst>
+              </p:cNvPr>
+              <p:cNvSpPr txBox="1"/>
+              <p:nvPr/>
+            </p:nvSpPr>
+            <p:spPr>
+              <a:xfrm>
+                <a:off x="8756169" y="2772236"/>
+                <a:ext cx="681926" cy="461665"/>
+              </a:xfrm>
+              <a:prstGeom prst="rect">
+                <a:avLst/>
+              </a:prstGeom>
+              <a:noFill/>
+            </p:spPr>
+            <p:txBody>
+              <a:bodyPr wrap="square" rtlCol="0">
+                <a:spAutoFit/>
+              </a:bodyPr>
+              <a:lstStyle/>
+              <a:p>
+                <a:pPr/>
+                <a14:m>
+                  <m:oMathPara xmlns:m="http://schemas.openxmlformats.org/officeDocument/2006/math">
+                    <m:oMathParaPr>
+                      <m:jc m:val="centerGroup"/>
+                    </m:oMathParaPr>
+                    <m:oMath xmlns:m="http://schemas.openxmlformats.org/officeDocument/2006/math">
+                      <m:r>
+                        <a:rPr lang="en-US" sz="2400" b="0" i="1" smtClean="0">
+                          <a:latin typeface="Cambria Math" panose="02040503050406030204" pitchFamily="18" charset="0"/>
+                        </a:rPr>
+                        <m:t>𝐺</m:t>
+                      </m:r>
+                    </m:oMath>
+                  </m:oMathPara>
+                </a14:m>
+                <a:endParaRPr lang="en-US" sz="2400" dirty="0"/>
+              </a:p>
+            </p:txBody>
+          </p:sp>
+        </mc:Choice>
+        <mc:Fallback>
+          <p:sp>
+            <p:nvSpPr>
+              <p:cNvPr id="44" name="TextBox 43">
+                <a:extLst>
+                  <a:ext uri="{FF2B5EF4-FFF2-40B4-BE49-F238E27FC236}">
+                    <a16:creationId xmlns:a16="http://schemas.microsoft.com/office/drawing/2014/main" id="{413B120B-3E30-4319-9DDB-8D73C9D3CCBE}"/>
+                  </a:ext>
+                </a:extLst>
+              </p:cNvPr>
+              <p:cNvSpPr txBox="1">
+                <a:spLocks noRot="1" noChangeAspect="1" noMove="1" noResize="1" noEditPoints="1" noAdjustHandles="1" noChangeArrowheads="1" noChangeShapeType="1" noTextEdit="1"/>
+              </p:cNvSpPr>
+              <p:nvPr/>
+            </p:nvSpPr>
+            <p:spPr>
+              <a:xfrm>
+                <a:off x="8756169" y="2772236"/>
+                <a:ext cx="681926" cy="461665"/>
+              </a:xfrm>
+              <a:prstGeom prst="rect">
+                <a:avLst/>
+              </a:prstGeom>
+              <a:blipFill>
+                <a:blip r:embed="rId14"/>
+                <a:stretch>
+                  <a:fillRect/>
+                </a:stretch>
+              </a:blipFill>
+            </p:spPr>
+            <p:txBody>
+              <a:bodyPr/>
+              <a:lstStyle/>
+              <a:p>
+                <a:r>
+                  <a:rPr lang="en-US">
+                    <a:noFill/>
+                  </a:rPr>
+                  <a:t> </a:t>
+                </a:r>
+              </a:p>
+            </p:txBody>
+          </p:sp>
+        </mc:Fallback>
+      </mc:AlternateContent>
+      <mc:AlternateContent xmlns:mc="http://schemas.openxmlformats.org/markup-compatibility/2006">
+        <mc:Choice xmlns:a14="http://schemas.microsoft.com/office/drawing/2010/main" Requires="a14">
+          <p:sp>
+            <p:nvSpPr>
+              <p:cNvPr id="45" name="TextBox 44">
+                <a:extLst>
+                  <a:ext uri="{FF2B5EF4-FFF2-40B4-BE49-F238E27FC236}">
+                    <a16:creationId xmlns:a16="http://schemas.microsoft.com/office/drawing/2014/main" id="{F704067E-1DD6-416C-BF4A-D3EED2932AAF}"/>
+                  </a:ext>
+                </a:extLst>
+              </p:cNvPr>
+              <p:cNvSpPr txBox="1"/>
+              <p:nvPr/>
+            </p:nvSpPr>
+            <p:spPr>
+              <a:xfrm>
+                <a:off x="5341323" y="2772236"/>
+                <a:ext cx="681926" cy="461665"/>
+              </a:xfrm>
+              <a:prstGeom prst="rect">
+                <a:avLst/>
+              </a:prstGeom>
+              <a:noFill/>
+            </p:spPr>
+            <p:txBody>
+              <a:bodyPr wrap="square" rtlCol="0">
+                <a:spAutoFit/>
+              </a:bodyPr>
+              <a:lstStyle/>
+              <a:p>
+                <a:pPr/>
+                <a14:m>
+                  <m:oMathPara xmlns:m="http://schemas.openxmlformats.org/officeDocument/2006/math">
+                    <m:oMathParaPr>
+                      <m:jc m:val="centerGroup"/>
+                    </m:oMathParaPr>
+                    <m:oMath xmlns:m="http://schemas.openxmlformats.org/officeDocument/2006/math">
+                      <m:r>
+                        <a:rPr lang="en-US" sz="2400" b="0" i="1" smtClean="0">
+                          <a:latin typeface="Cambria Math" panose="02040503050406030204" pitchFamily="18" charset="0"/>
+                        </a:rPr>
+                        <m:t>𝑈</m:t>
+                      </m:r>
+                    </m:oMath>
+                  </m:oMathPara>
+                </a14:m>
+                <a:endParaRPr lang="en-US" sz="2400" dirty="0"/>
+              </a:p>
+            </p:txBody>
+          </p:sp>
+        </mc:Choice>
+        <mc:Fallback>
+          <p:sp>
+            <p:nvSpPr>
+              <p:cNvPr id="45" name="TextBox 44">
+                <a:extLst>
+                  <a:ext uri="{FF2B5EF4-FFF2-40B4-BE49-F238E27FC236}">
+                    <a16:creationId xmlns:a16="http://schemas.microsoft.com/office/drawing/2014/main" id="{F704067E-1DD6-416C-BF4A-D3EED2932AAF}"/>
+                  </a:ext>
+                </a:extLst>
+              </p:cNvPr>
+              <p:cNvSpPr txBox="1">
+                <a:spLocks noRot="1" noChangeAspect="1" noMove="1" noResize="1" noEditPoints="1" noAdjustHandles="1" noChangeArrowheads="1" noChangeShapeType="1" noTextEdit="1"/>
+              </p:cNvSpPr>
+              <p:nvPr/>
+            </p:nvSpPr>
+            <p:spPr>
+              <a:xfrm>
+                <a:off x="5341323" y="2772236"/>
+                <a:ext cx="681926" cy="461665"/>
+              </a:xfrm>
+              <a:prstGeom prst="rect">
+                <a:avLst/>
+              </a:prstGeom>
+              <a:blipFill>
+                <a:blip r:embed="rId15"/>
+                <a:stretch>
+                  <a:fillRect/>
+                </a:stretch>
+              </a:blipFill>
+            </p:spPr>
+            <p:txBody>
+              <a:bodyPr/>
+              <a:lstStyle/>
+              <a:p>
+                <a:r>
+                  <a:rPr lang="en-US">
+                    <a:noFill/>
+                  </a:rPr>
+                  <a:t> </a:t>
+                </a:r>
+              </a:p>
+            </p:txBody>
+          </p:sp>
+        </mc:Fallback>
+      </mc:AlternateContent>
+      <mc:AlternateContent xmlns:mc="http://schemas.openxmlformats.org/markup-compatibility/2006">
+        <mc:Choice xmlns:a14="http://schemas.microsoft.com/office/drawing/2010/main" Requires="a14">
+          <p:sp>
+            <p:nvSpPr>
+              <p:cNvPr id="46" name="TextBox 45">
+                <a:extLst>
+                  <a:ext uri="{FF2B5EF4-FFF2-40B4-BE49-F238E27FC236}">
+                    <a16:creationId xmlns:a16="http://schemas.microsoft.com/office/drawing/2014/main" id="{CC4E87CD-A580-4EF4-A72B-5DB665B46E89}"/>
+                  </a:ext>
+                </a:extLst>
+              </p:cNvPr>
+              <p:cNvSpPr txBox="1"/>
+              <p:nvPr/>
+            </p:nvSpPr>
+            <p:spPr>
+              <a:xfrm>
+                <a:off x="7052556" y="4490372"/>
+                <a:ext cx="681926" cy="461665"/>
+              </a:xfrm>
+              <a:prstGeom prst="rect">
+                <a:avLst/>
+              </a:prstGeom>
+              <a:noFill/>
+            </p:spPr>
+            <p:txBody>
+              <a:bodyPr wrap="square" rtlCol="0">
+                <a:spAutoFit/>
+              </a:bodyPr>
+              <a:lstStyle/>
+              <a:p>
+                <a:pPr/>
+                <a14:m>
+                  <m:oMathPara xmlns:m="http://schemas.openxmlformats.org/officeDocument/2006/math">
+                    <m:oMathParaPr>
+                      <m:jc m:val="centerGroup"/>
+                    </m:oMathParaPr>
+                    <m:oMath xmlns:m="http://schemas.openxmlformats.org/officeDocument/2006/math">
+                      <m:r>
+                        <a:rPr lang="en-US" sz="2400" b="0" i="1" smtClean="0">
+                          <a:latin typeface="Cambria Math" panose="02040503050406030204" pitchFamily="18" charset="0"/>
+                        </a:rPr>
+                        <m:t>𝐻</m:t>
+                      </m:r>
+                    </m:oMath>
+                  </m:oMathPara>
+                </a14:m>
+                <a:endParaRPr lang="en-US" sz="2400" dirty="0"/>
+              </a:p>
+            </p:txBody>
+          </p:sp>
+        </mc:Choice>
+        <mc:Fallback>
+          <p:sp>
+            <p:nvSpPr>
+              <p:cNvPr id="46" name="TextBox 45">
+                <a:extLst>
+                  <a:ext uri="{FF2B5EF4-FFF2-40B4-BE49-F238E27FC236}">
+                    <a16:creationId xmlns:a16="http://schemas.microsoft.com/office/drawing/2014/main" id="{CC4E87CD-A580-4EF4-A72B-5DB665B46E89}"/>
+                  </a:ext>
+                </a:extLst>
+              </p:cNvPr>
+              <p:cNvSpPr txBox="1">
+                <a:spLocks noRot="1" noChangeAspect="1" noMove="1" noResize="1" noEditPoints="1" noAdjustHandles="1" noChangeArrowheads="1" noChangeShapeType="1" noTextEdit="1"/>
+              </p:cNvSpPr>
+              <p:nvPr/>
+            </p:nvSpPr>
+            <p:spPr>
+              <a:xfrm>
+                <a:off x="7052556" y="4490372"/>
+                <a:ext cx="681926" cy="461665"/>
+              </a:xfrm>
+              <a:prstGeom prst="rect">
+                <a:avLst/>
+              </a:prstGeom>
+              <a:blipFill>
+                <a:blip r:embed="rId16"/>
+                <a:stretch>
+                  <a:fillRect/>
+                </a:stretch>
+              </a:blipFill>
+            </p:spPr>
+            <p:txBody>
+              <a:bodyPr/>
+              <a:lstStyle/>
+              <a:p>
+                <a:r>
+                  <a:rPr lang="en-US">
+                    <a:noFill/>
+                  </a:rPr>
+                  <a:t> </a:t>
+                </a:r>
+              </a:p>
+            </p:txBody>
+          </p:sp>
+        </mc:Fallback>
+      </mc:AlternateContent>
+      <mc:AlternateContent xmlns:mc="http://schemas.openxmlformats.org/markup-compatibility/2006">
+        <mc:Choice xmlns:a14="http://schemas.microsoft.com/office/drawing/2010/main" Requires="a14">
+          <p:sp>
+            <p:nvSpPr>
+              <p:cNvPr id="47" name="TextBox 46">
+                <a:extLst>
+                  <a:ext uri="{FF2B5EF4-FFF2-40B4-BE49-F238E27FC236}">
+                    <a16:creationId xmlns:a16="http://schemas.microsoft.com/office/drawing/2014/main" id="{08DDB88A-C5B7-45ED-89F1-A21E43EBCDCA}"/>
+                  </a:ext>
+                </a:extLst>
+              </p:cNvPr>
+              <p:cNvSpPr txBox="1"/>
+              <p:nvPr/>
+            </p:nvSpPr>
+            <p:spPr>
+              <a:xfrm>
+                <a:off x="8756169" y="4490372"/>
+                <a:ext cx="681926" cy="461665"/>
+              </a:xfrm>
+              <a:prstGeom prst="rect">
+                <a:avLst/>
+              </a:prstGeom>
+              <a:noFill/>
+            </p:spPr>
+            <p:txBody>
+              <a:bodyPr wrap="square" rtlCol="0">
+                <a:spAutoFit/>
+              </a:bodyPr>
+              <a:lstStyle/>
+              <a:p>
+                <a:pPr/>
+                <a14:m>
+                  <m:oMathPara xmlns:m="http://schemas.openxmlformats.org/officeDocument/2006/math">
+                    <m:oMathParaPr>
+                      <m:jc m:val="centerGroup"/>
+                    </m:oMathParaPr>
+                    <m:oMath xmlns:m="http://schemas.openxmlformats.org/officeDocument/2006/math">
+                      <m:r>
+                        <a:rPr lang="en-US" sz="2400" b="0" i="1" smtClean="0">
+                          <a:latin typeface="Cambria Math" panose="02040503050406030204" pitchFamily="18" charset="0"/>
+                        </a:rPr>
+                        <m:t>𝑃</m:t>
+                      </m:r>
+                    </m:oMath>
+                  </m:oMathPara>
+                </a14:m>
+                <a:endParaRPr lang="en-US" sz="2400" dirty="0"/>
+              </a:p>
+            </p:txBody>
+          </p:sp>
+        </mc:Choice>
+        <mc:Fallback>
+          <p:sp>
+            <p:nvSpPr>
+              <p:cNvPr id="47" name="TextBox 46">
+                <a:extLst>
+                  <a:ext uri="{FF2B5EF4-FFF2-40B4-BE49-F238E27FC236}">
+                    <a16:creationId xmlns:a16="http://schemas.microsoft.com/office/drawing/2014/main" id="{08DDB88A-C5B7-45ED-89F1-A21E43EBCDCA}"/>
+                  </a:ext>
+                </a:extLst>
+              </p:cNvPr>
+              <p:cNvSpPr txBox="1">
+                <a:spLocks noRot="1" noChangeAspect="1" noMove="1" noResize="1" noEditPoints="1" noAdjustHandles="1" noChangeArrowheads="1" noChangeShapeType="1" noTextEdit="1"/>
+              </p:cNvSpPr>
+              <p:nvPr/>
+            </p:nvSpPr>
+            <p:spPr>
+              <a:xfrm>
+                <a:off x="8756169" y="4490372"/>
+                <a:ext cx="681926" cy="461665"/>
+              </a:xfrm>
+              <a:prstGeom prst="rect">
+                <a:avLst/>
+              </a:prstGeom>
+              <a:blipFill>
+                <a:blip r:embed="rId17"/>
+                <a:stretch>
+                  <a:fillRect/>
+                </a:stretch>
+              </a:blipFill>
+            </p:spPr>
+            <p:txBody>
+              <a:bodyPr/>
+              <a:lstStyle/>
+              <a:p>
+                <a:r>
+                  <a:rPr lang="en-US">
+                    <a:noFill/>
+                  </a:rPr>
+                  <a:t> </a:t>
+                </a:r>
+              </a:p>
+            </p:txBody>
+          </p:sp>
+        </mc:Fallback>
+      </mc:AlternateContent>
+      <mc:AlternateContent xmlns:mc="http://schemas.openxmlformats.org/markup-compatibility/2006">
+        <mc:Choice xmlns:a14="http://schemas.microsoft.com/office/drawing/2010/main" Requires="a14">
+          <p:sp>
+            <p:nvSpPr>
+              <p:cNvPr id="49" name="TextBox 48">
+                <a:extLst>
+                  <a:ext uri="{FF2B5EF4-FFF2-40B4-BE49-F238E27FC236}">
+                    <a16:creationId xmlns:a16="http://schemas.microsoft.com/office/drawing/2014/main" id="{27D0B0C9-FDA9-48B8-B61C-A9693F0745AC}"/>
+                  </a:ext>
+                </a:extLst>
+              </p:cNvPr>
+              <p:cNvSpPr txBox="1"/>
+              <p:nvPr/>
+            </p:nvSpPr>
+            <p:spPr>
+              <a:xfrm>
+                <a:off x="5341323" y="4490372"/>
+                <a:ext cx="681926" cy="461665"/>
+              </a:xfrm>
+              <a:prstGeom prst="rect">
+                <a:avLst/>
+              </a:prstGeom>
+              <a:noFill/>
+            </p:spPr>
+            <p:txBody>
+              <a:bodyPr wrap="square" rtlCol="0">
+                <a:spAutoFit/>
+              </a:bodyPr>
+              <a:lstStyle/>
+              <a:p>
+                <a:pPr/>
+                <a14:m>
+                  <m:oMathPara xmlns:m="http://schemas.openxmlformats.org/officeDocument/2006/math">
+                    <m:oMathParaPr>
+                      <m:jc m:val="centerGroup"/>
+                    </m:oMathParaPr>
+                    <m:oMath xmlns:m="http://schemas.openxmlformats.org/officeDocument/2006/math">
+                      <m:r>
+                        <a:rPr lang="en-US" sz="2400" b="0" i="1" smtClean="0">
+                          <a:latin typeface="Cambria Math" panose="02040503050406030204" pitchFamily="18" charset="0"/>
+                        </a:rPr>
+                        <m:t>𝑆</m:t>
+                      </m:r>
+                    </m:oMath>
+                  </m:oMathPara>
+                </a14:m>
+                <a:endParaRPr lang="en-US" sz="2400" dirty="0"/>
+              </a:p>
+            </p:txBody>
+          </p:sp>
+        </mc:Choice>
+        <mc:Fallback>
+          <p:sp>
+            <p:nvSpPr>
+              <p:cNvPr id="49" name="TextBox 48">
+                <a:extLst>
+                  <a:ext uri="{FF2B5EF4-FFF2-40B4-BE49-F238E27FC236}">
+                    <a16:creationId xmlns:a16="http://schemas.microsoft.com/office/drawing/2014/main" id="{27D0B0C9-FDA9-48B8-B61C-A9693F0745AC}"/>
+                  </a:ext>
+                </a:extLst>
+              </p:cNvPr>
+              <p:cNvSpPr txBox="1">
+                <a:spLocks noRot="1" noChangeAspect="1" noMove="1" noResize="1" noEditPoints="1" noAdjustHandles="1" noChangeArrowheads="1" noChangeShapeType="1" noTextEdit="1"/>
+              </p:cNvSpPr>
+              <p:nvPr/>
+            </p:nvSpPr>
+            <p:spPr>
+              <a:xfrm>
+                <a:off x="5341323" y="4490372"/>
+                <a:ext cx="681926" cy="461665"/>
+              </a:xfrm>
+              <a:prstGeom prst="rect">
+                <a:avLst/>
+              </a:prstGeom>
+              <a:blipFill>
+                <a:blip r:embed="rId18"/>
+                <a:stretch>
+                  <a:fillRect/>
+                </a:stretch>
+              </a:blipFill>
+            </p:spPr>
+            <p:txBody>
+              <a:bodyPr/>
+              <a:lstStyle/>
+              <a:p>
+                <a:r>
+                  <a:rPr lang="en-US">
+                    <a:noFill/>
+                  </a:rPr>
+                  <a:t> </a:t>
+                </a:r>
+              </a:p>
+            </p:txBody>
+          </p:sp>
+        </mc:Fallback>
+      </mc:AlternateContent>
+      <p:cxnSp>
+        <p:nvCxnSpPr>
+          <p:cNvPr id="51" name="Straight Arrow Connector 50">
+            <a:extLst>
+              <a:ext uri="{FF2B5EF4-FFF2-40B4-BE49-F238E27FC236}">
+                <a16:creationId xmlns:a16="http://schemas.microsoft.com/office/drawing/2014/main" id="{2AFDE2B8-37E6-4A61-851D-1AAFAD7AB087}"/>
+              </a:ext>
+            </a:extLst>
+          </p:cNvPr>
+          <p:cNvCxnSpPr>
+            <a:cxnSpLocks/>
+          </p:cNvCxnSpPr>
+          <p:nvPr/>
+        </p:nvCxnSpPr>
+        <p:spPr>
+          <a:xfrm flipV="1">
+            <a:off x="6048603" y="1675785"/>
+            <a:ext cx="2682212" cy="2671616"/>
+          </a:xfrm>
+          <a:prstGeom prst="straightConnector1">
+            <a:avLst/>
+          </a:prstGeom>
+          <a:ln w="25400">
+            <a:tailEnd type="stealth" w="lg" len="lg"/>
+          </a:ln>
+        </p:spPr>
+        <p:style>
+          <a:lnRef idx="1">
+            <a:schemeClr val="dk1"/>
+          </a:lnRef>
+          <a:fillRef idx="0">
+            <a:schemeClr val="dk1"/>
+          </a:fillRef>
+          <a:effectRef idx="0">
+            <a:schemeClr val="dk1"/>
+          </a:effectRef>
+          <a:fontRef idx="minor">
+            <a:schemeClr val="tx1"/>
+          </a:fontRef>
+        </p:style>
+      </p:cxnSp>
+      <p:cxnSp>
+        <p:nvCxnSpPr>
+          <p:cNvPr id="52" name="Straight Arrow Connector 51">
+            <a:extLst>
+              <a:ext uri="{FF2B5EF4-FFF2-40B4-BE49-F238E27FC236}">
+                <a16:creationId xmlns:a16="http://schemas.microsoft.com/office/drawing/2014/main" id="{D721573C-A823-4BEC-9526-19FCD51A8062}"/>
+              </a:ext>
+            </a:extLst>
+          </p:cNvPr>
+          <p:cNvCxnSpPr>
+            <a:cxnSpLocks/>
+          </p:cNvCxnSpPr>
+          <p:nvPr/>
+        </p:nvCxnSpPr>
+        <p:spPr>
+          <a:xfrm flipH="1" flipV="1">
+            <a:off x="6076603" y="1675785"/>
+            <a:ext cx="2654212" cy="2671615"/>
+          </a:xfrm>
+          <a:prstGeom prst="straightConnector1">
+            <a:avLst/>
+          </a:prstGeom>
+          <a:ln w="25400">
+            <a:tailEnd type="stealth" w="lg" len="lg"/>
+          </a:ln>
+        </p:spPr>
+        <p:style>
+          <a:lnRef idx="1">
+            <a:schemeClr val="dk1"/>
+          </a:lnRef>
+          <a:fillRef idx="0">
+            <a:schemeClr val="dk1"/>
+          </a:fillRef>
+          <a:effectRef idx="0">
+            <a:schemeClr val="dk1"/>
+          </a:effectRef>
+          <a:fontRef idx="minor">
+            <a:schemeClr val="tx1"/>
+          </a:fontRef>
+        </p:style>
+      </p:cxnSp>
+    </p:spTree>
+    <p:extLst>
+      <p:ext uri="{BB962C8B-B14F-4D97-AF65-F5344CB8AC3E}">
+        <p14:creationId xmlns:p14="http://schemas.microsoft.com/office/powerpoint/2010/main" val="4284880414"/>
       </p:ext>
     </p:extLst>
   </p:cSld>

</xml_diff>